<commit_message>
WebTest presentation, List, Map, Object, and Service routes.
</commit_message>
<xml_diff>
--- a/Nasdanika HTML.pptx
+++ b/Nasdanika HTML.pptx
@@ -308,7 +308,7 @@
             <a:fld id="{73396D94-1E99-4A60-98C5-CD1513B04F60}" type="datetimeFigureOut">
               <a:rPr lang="en-US" smtClean="0"/>
               <a:pPr/>
-              <a:t>5/26/2014</a:t>
+              <a:t>10/10/2014</a:t>
             </a:fld>
             <a:endParaRPr lang="en-US"/>
           </a:p>
@@ -475,7 +475,7 @@
             <a:fld id="{73396D94-1E99-4A60-98C5-CD1513B04F60}" type="datetimeFigureOut">
               <a:rPr lang="en-US" smtClean="0"/>
               <a:pPr/>
-              <a:t>5/26/2014</a:t>
+              <a:t>10/10/2014</a:t>
             </a:fld>
             <a:endParaRPr lang="en-US"/>
           </a:p>
@@ -652,7 +652,7 @@
             <a:fld id="{73396D94-1E99-4A60-98C5-CD1513B04F60}" type="datetimeFigureOut">
               <a:rPr lang="en-US" smtClean="0"/>
               <a:pPr/>
-              <a:t>5/26/2014</a:t>
+              <a:t>10/10/2014</a:t>
             </a:fld>
             <a:endParaRPr lang="en-US"/>
           </a:p>
@@ -819,7 +819,7 @@
             <a:fld id="{73396D94-1E99-4A60-98C5-CD1513B04F60}" type="datetimeFigureOut">
               <a:rPr lang="en-US" smtClean="0"/>
               <a:pPr/>
-              <a:t>5/26/2014</a:t>
+              <a:t>10/10/2014</a:t>
             </a:fld>
             <a:endParaRPr lang="en-US"/>
           </a:p>
@@ -1063,7 +1063,7 @@
             <a:fld id="{73396D94-1E99-4A60-98C5-CD1513B04F60}" type="datetimeFigureOut">
               <a:rPr lang="en-US" smtClean="0"/>
               <a:pPr/>
-              <a:t>5/26/2014</a:t>
+              <a:t>10/10/2014</a:t>
             </a:fld>
             <a:endParaRPr lang="en-US"/>
           </a:p>
@@ -1329,7 +1329,7 @@
             <a:fld id="{73396D94-1E99-4A60-98C5-CD1513B04F60}" type="datetimeFigureOut">
               <a:rPr lang="en-US" smtClean="0"/>
               <a:pPr/>
-              <a:t>5/26/2014</a:t>
+              <a:t>10/10/2014</a:t>
             </a:fld>
             <a:endParaRPr lang="en-US"/>
           </a:p>
@@ -1709,7 +1709,7 @@
             <a:fld id="{73396D94-1E99-4A60-98C5-CD1513B04F60}" type="datetimeFigureOut">
               <a:rPr lang="en-US" smtClean="0"/>
               <a:pPr/>
-              <a:t>5/26/2014</a:t>
+              <a:t>10/10/2014</a:t>
             </a:fld>
             <a:endParaRPr lang="en-US"/>
           </a:p>
@@ -1861,7 +1861,7 @@
             <a:fld id="{73396D94-1E99-4A60-98C5-CD1513B04F60}" type="datetimeFigureOut">
               <a:rPr lang="en-US" smtClean="0"/>
               <a:pPr/>
-              <a:t>5/26/2014</a:t>
+              <a:t>10/10/2014</a:t>
             </a:fld>
             <a:endParaRPr lang="en-US"/>
           </a:p>
@@ -1953,7 +1953,7 @@
             <a:fld id="{73396D94-1E99-4A60-98C5-CD1513B04F60}" type="datetimeFigureOut">
               <a:rPr lang="en-US" smtClean="0"/>
               <a:pPr/>
-              <a:t>5/26/2014</a:t>
+              <a:t>10/10/2014</a:t>
             </a:fld>
             <a:endParaRPr lang="en-US"/>
           </a:p>
@@ -2216,7 +2216,7 @@
             <a:fld id="{73396D94-1E99-4A60-98C5-CD1513B04F60}" type="datetimeFigureOut">
               <a:rPr lang="en-US" smtClean="0"/>
               <a:pPr/>
-              <a:t>5/26/2014</a:t>
+              <a:t>10/10/2014</a:t>
             </a:fld>
             <a:endParaRPr lang="en-US"/>
           </a:p>
@@ -2506,7 +2506,7 @@
             <a:fld id="{73396D94-1E99-4A60-98C5-CD1513B04F60}" type="datetimeFigureOut">
               <a:rPr lang="en-US" smtClean="0"/>
               <a:pPr/>
-              <a:t>5/26/2014</a:t>
+              <a:t>10/10/2014</a:t>
             </a:fld>
             <a:endParaRPr lang="en-US"/>
           </a:p>
@@ -3279,7 +3279,7 @@
             <a:fld id="{73396D94-1E99-4A60-98C5-CD1513B04F60}" type="datetimeFigureOut">
               <a:rPr lang="en-US" smtClean="0"/>
               <a:pPr/>
-              <a:t>5/26/2014</a:t>
+              <a:t>10/10/2014</a:t>
             </a:fld>
             <a:endParaRPr lang="en-US"/>
           </a:p>
@@ -3953,7 +3953,11 @@
           <a:p>
             <a:r>
               <a:rPr lang="en-US" dirty="0" smtClean="0"/>
-              <a:t>v. 1.2.0</a:t>
+              <a:t>v. </a:t>
+            </a:r>
+            <a:r>
+              <a:rPr lang="en-US" dirty="0" smtClean="0"/>
+              <a:t>1.3.0</a:t>
             </a:r>
             <a:endParaRPr lang="en-US" dirty="0"/>
           </a:p>
@@ -8995,25 +8999,116 @@
         </p:nvSpPr>
         <p:spPr/>
         <p:txBody>
-          <a:bodyPr/>
+          <a:bodyPr>
+            <a:normAutofit/>
+          </a:bodyPr>
           <a:lstStyle/>
           <a:p>
             <a:r>
               <a:rPr lang="en-US" dirty="0" smtClean="0"/>
-              <a:t>Sources: </a:t>
-            </a:r>
-          </a:p>
-          <a:p>
-            <a:pPr lvl="1"/>
-            <a:r>
-              <a:rPr lang="en-US" sz="1400" dirty="0" smtClean="0"/>
-              <a:t>Master - </a:t>
-            </a:r>
-            <a:r>
-              <a:rPr lang="en-US" sz="1400" dirty="0" smtClean="0">
+              <a:t>Wiki - </a:t>
+            </a:r>
+            <a:r>
+              <a:rPr lang="en-US" sz="1200" dirty="0" smtClean="0">
                 <a:hlinkClick r:id="rId2"/>
               </a:rPr>
-              <a:t>https://github.com/Nasdanika/server/tree/master/org.nasdanika.html</a:t>
+              <a:t>https://</a:t>
+            </a:r>
+            <a:r>
+              <a:rPr lang="en-US" sz="1200" dirty="0" smtClean="0">
+                <a:hlinkClick r:id="rId2"/>
+              </a:rPr>
+              <a:t>github.com/Nasdanika/server/wiki/html</a:t>
+            </a:r>
+            <a:r>
+              <a:rPr lang="en-US" dirty="0" smtClean="0"/>
+              <a:t> </a:t>
+            </a:r>
+            <a:endParaRPr lang="en-US" dirty="0" smtClean="0"/>
+          </a:p>
+          <a:p>
+            <a:r>
+              <a:rPr lang="en-US" dirty="0" err="1" smtClean="0"/>
+              <a:t>WebTest</a:t>
+            </a:r>
+            <a:r>
+              <a:rPr lang="en-US" dirty="0" smtClean="0"/>
+              <a:t> report – </a:t>
+            </a:r>
+            <a:r>
+              <a:rPr lang="en-US" sz="2400" i="1" dirty="0" smtClean="0">
+                <a:latin typeface="+mj-lt"/>
+              </a:rPr>
+              <a:t>generated with </a:t>
+            </a:r>
+            <a:r>
+              <a:rPr lang="en-US" sz="2400" i="1" dirty="0" err="1" smtClean="0">
+                <a:latin typeface="+mj-lt"/>
+              </a:rPr>
+              <a:t>Nasdanika</a:t>
+            </a:r>
+            <a:r>
+              <a:rPr lang="en-US" sz="2400" i="1" dirty="0" smtClean="0">
+                <a:latin typeface="+mj-lt"/>
+              </a:rPr>
+              <a:t> HTML and shows </a:t>
+            </a:r>
+            <a:r>
+              <a:rPr lang="en-US" sz="2400" i="1" dirty="0" smtClean="0">
+                <a:latin typeface="+mj-lt"/>
+              </a:rPr>
+              <a:t>screenshots of the application also generated with </a:t>
+            </a:r>
+            <a:r>
+              <a:rPr lang="en-US" sz="2400" i="1" dirty="0" err="1" smtClean="0">
+                <a:latin typeface="+mj-lt"/>
+              </a:rPr>
+              <a:t>Nasdanika</a:t>
+            </a:r>
+            <a:r>
+              <a:rPr lang="en-US" sz="2400" i="1" dirty="0" smtClean="0">
+                <a:latin typeface="+mj-lt"/>
+              </a:rPr>
+              <a:t> HTML </a:t>
+            </a:r>
+            <a:r>
+              <a:rPr lang="en-US" dirty="0" smtClean="0"/>
+              <a:t>– </a:t>
+            </a:r>
+            <a:r>
+              <a:rPr lang="en-US" sz="1200" dirty="0" smtClean="0">
+                <a:hlinkClick r:id="rId3"/>
+              </a:rPr>
+              <a:t>http://www.nasdanika.org/examples/test-report</a:t>
+            </a:r>
+            <a:r>
+              <a:rPr lang="en-US" sz="1200" dirty="0" smtClean="0">
+                <a:hlinkClick r:id="rId3"/>
+              </a:rPr>
+              <a:t>/</a:t>
+            </a:r>
+            <a:r>
+              <a:rPr lang="en-US" dirty="0" smtClean="0"/>
+              <a:t> </a:t>
+            </a:r>
+            <a:endParaRPr lang="en-US" dirty="0" smtClean="0"/>
+          </a:p>
+          <a:p>
+            <a:r>
+              <a:rPr lang="en-US" dirty="0" smtClean="0"/>
+              <a:t>Sources - </a:t>
+            </a:r>
+            <a:r>
+              <a:rPr lang="en-US" sz="1200" dirty="0" smtClean="0">
+                <a:hlinkClick r:id="rId4"/>
+              </a:rPr>
+              <a:t>https</a:t>
+            </a:r>
+            <a:r>
+              <a:rPr lang="en-US" sz="1200" dirty="0" smtClean="0">
+                <a:hlinkClick r:id="rId4"/>
+              </a:rPr>
+              <a:t>://github.com/Nasdanika/server/tree/master/org.nasdanika.html</a:t>
             </a:r>
             <a:r>
               <a:rPr lang="en-US" sz="1400" dirty="0" smtClean="0"/>
@@ -9021,25 +9116,28 @@
             </a:r>
           </a:p>
           <a:p>
-            <a:pPr lvl="1"/>
-            <a:r>
-              <a:rPr lang="en-US" sz="1400" dirty="0" smtClean="0"/>
-              <a:t>Release  1.2.0 - </a:t>
-            </a:r>
-            <a:r>
-              <a:rPr lang="en-US" sz="1400" dirty="0" smtClean="0">
-                <a:hlinkClick r:id="rId3"/>
+            <a:r>
+              <a:rPr lang="en-US" dirty="0" err="1" smtClean="0"/>
+              <a:t>JavaDoc</a:t>
+            </a:r>
+            <a:r>
+              <a:rPr lang="en-US" dirty="0" smtClean="0"/>
+              <a:t> – </a:t>
+            </a:r>
+            <a:r>
+              <a:rPr lang="en-US" sz="1200" dirty="0" smtClean="0">
+                <a:hlinkClick r:id="rId5"/>
               </a:rPr>
-              <a:t>https://</a:t>
-            </a:r>
-            <a:r>
-              <a:rPr lang="en-US" sz="1400" smtClean="0">
-                <a:hlinkClick r:id="rId3"/>
+              <a:t>http://</a:t>
+            </a:r>
+            <a:r>
+              <a:rPr lang="en-US" sz="1200" dirty="0" smtClean="0">
+                <a:hlinkClick r:id="rId5"/>
               </a:rPr>
-              <a:t>github.com/Nasdanika/server/releases/tag/html-1.3.0</a:t>
-            </a:r>
-            <a:r>
-              <a:rPr lang="en-US" sz="1400" smtClean="0"/>
+              <a:t>www.nasdanika.org/server/apidocs/org/nasdanika/html/package-summary.html</a:t>
+            </a:r>
+            <a:r>
+              <a:rPr lang="en-US" dirty="0" smtClean="0"/>
               <a:t>  </a:t>
             </a:r>
             <a:endParaRPr lang="en-US" dirty="0" smtClean="0"/>
@@ -9047,28 +9145,19 @@
           <a:p>
             <a:r>
               <a:rPr lang="en-US" dirty="0" smtClean="0"/>
-              <a:t>Bootstrap themes - </a:t>
-            </a:r>
-            <a:r>
-              <a:rPr lang="en-US" dirty="0" smtClean="0">
-                <a:hlinkClick r:id="rId4"/>
+              <a:t>Bootstrap </a:t>
+            </a:r>
+            <a:r>
+              <a:rPr lang="en-US" dirty="0" smtClean="0"/>
+              <a:t>themes - </a:t>
+            </a:r>
+            <a:r>
+              <a:rPr lang="en-US" sz="1200" dirty="0" smtClean="0">
+                <a:hlinkClick r:id="rId6"/>
               </a:rPr>
               <a:t>http://bootswatch.com/</a:t>
             </a:r>
-            <a:endParaRPr lang="en-US" dirty="0" smtClean="0"/>
-          </a:p>
-          <a:p>
-            <a:r>
-              <a:rPr lang="en-US" dirty="0" smtClean="0"/>
-              <a:t>Bootstrap theme roller - </a:t>
-            </a:r>
-            <a:r>
-              <a:rPr lang="en-US" dirty="0" smtClean="0">
-                <a:hlinkClick r:id="rId5"/>
-              </a:rPr>
-              <a:t>http://www.bootstrapthemeroller.com/index.html</a:t>
-            </a:r>
-            <a:endParaRPr lang="en-US" dirty="0" smtClean="0"/>
+            <a:endParaRPr lang="en-US" sz="1200" dirty="0" smtClean="0"/>
           </a:p>
           <a:p>
             <a:r>
@@ -9077,11 +9166,15 @@
             </a:r>
             <a:r>
               <a:rPr lang="en-US" dirty="0" smtClean="0"/>
-              <a:t> Foundation Server presentation - </a:t>
-            </a:r>
-            <a:r>
-              <a:rPr lang="en-US" dirty="0" smtClean="0">
-                <a:hlinkClick r:id="rId6"/>
+              <a:t> </a:t>
+            </a:r>
+            <a:r>
+              <a:rPr lang="en-US" dirty="0" smtClean="0"/>
+              <a:t>Foundation Server presentation - </a:t>
+            </a:r>
+            <a:r>
+              <a:rPr lang="en-US" sz="1200" dirty="0" smtClean="0">
+                <a:hlinkClick r:id="rId7"/>
               </a:rPr>
               <a:t>http://www.slideshare.net/PavelVlasov2/nasdanika-foundation-server</a:t>
             </a:r>

</xml_diff>

<commit_message>
HTML: Theme enum and bootstrapRoutingApplication Web: Modification of the extension point for DefaultHtmlFactory - bootstrapCssContainer attribute WebTest: feature version 0.1.0 Workspace Wizard: Generates all projects shells, feature, target, parent and aggregator projects are done.
</commit_message>
<xml_diff>
--- a/Nasdanika HTML.pptx
+++ b/Nasdanika HTML.pptx
@@ -32,7 +32,8 @@
     <p:sldId id="280" r:id="rId26"/>
     <p:sldId id="281" r:id="rId27"/>
     <p:sldId id="282" r:id="rId28"/>
-    <p:sldId id="277" r:id="rId29"/>
+    <p:sldId id="284" r:id="rId29"/>
+    <p:sldId id="277" r:id="rId30"/>
   </p:sldIdLst>
   <p:sldSz cx="9144000" cy="6858000" type="screen4x3"/>
   <p:notesSz cx="6858000" cy="9144000"/>
@@ -308,7 +309,7 @@
             <a:fld id="{73396D94-1E99-4A60-98C5-CD1513B04F60}" type="datetimeFigureOut">
               <a:rPr lang="en-US" smtClean="0"/>
               <a:pPr/>
-              <a:t>10/10/2014</a:t>
+              <a:t>10/22/2014</a:t>
             </a:fld>
             <a:endParaRPr lang="en-US"/>
           </a:p>
@@ -475,7 +476,7 @@
             <a:fld id="{73396D94-1E99-4A60-98C5-CD1513B04F60}" type="datetimeFigureOut">
               <a:rPr lang="en-US" smtClean="0"/>
               <a:pPr/>
-              <a:t>10/10/2014</a:t>
+              <a:t>10/22/2014</a:t>
             </a:fld>
             <a:endParaRPr lang="en-US"/>
           </a:p>
@@ -652,7 +653,7 @@
             <a:fld id="{73396D94-1E99-4A60-98C5-CD1513B04F60}" type="datetimeFigureOut">
               <a:rPr lang="en-US" smtClean="0"/>
               <a:pPr/>
-              <a:t>10/10/2014</a:t>
+              <a:t>10/22/2014</a:t>
             </a:fld>
             <a:endParaRPr lang="en-US"/>
           </a:p>
@@ -819,7 +820,7 @@
             <a:fld id="{73396D94-1E99-4A60-98C5-CD1513B04F60}" type="datetimeFigureOut">
               <a:rPr lang="en-US" smtClean="0"/>
               <a:pPr/>
-              <a:t>10/10/2014</a:t>
+              <a:t>10/22/2014</a:t>
             </a:fld>
             <a:endParaRPr lang="en-US"/>
           </a:p>
@@ -1063,7 +1064,7 @@
             <a:fld id="{73396D94-1E99-4A60-98C5-CD1513B04F60}" type="datetimeFigureOut">
               <a:rPr lang="en-US" smtClean="0"/>
               <a:pPr/>
-              <a:t>10/10/2014</a:t>
+              <a:t>10/22/2014</a:t>
             </a:fld>
             <a:endParaRPr lang="en-US"/>
           </a:p>
@@ -1329,7 +1330,7 @@
             <a:fld id="{73396D94-1E99-4A60-98C5-CD1513B04F60}" type="datetimeFigureOut">
               <a:rPr lang="en-US" smtClean="0"/>
               <a:pPr/>
-              <a:t>10/10/2014</a:t>
+              <a:t>10/22/2014</a:t>
             </a:fld>
             <a:endParaRPr lang="en-US"/>
           </a:p>
@@ -1709,7 +1710,7 @@
             <a:fld id="{73396D94-1E99-4A60-98C5-CD1513B04F60}" type="datetimeFigureOut">
               <a:rPr lang="en-US" smtClean="0"/>
               <a:pPr/>
-              <a:t>10/10/2014</a:t>
+              <a:t>10/22/2014</a:t>
             </a:fld>
             <a:endParaRPr lang="en-US"/>
           </a:p>
@@ -1861,7 +1862,7 @@
             <a:fld id="{73396D94-1E99-4A60-98C5-CD1513B04F60}" type="datetimeFigureOut">
               <a:rPr lang="en-US" smtClean="0"/>
               <a:pPr/>
-              <a:t>10/10/2014</a:t>
+              <a:t>10/22/2014</a:t>
             </a:fld>
             <a:endParaRPr lang="en-US"/>
           </a:p>
@@ -1953,7 +1954,7 @@
             <a:fld id="{73396D94-1E99-4A60-98C5-CD1513B04F60}" type="datetimeFigureOut">
               <a:rPr lang="en-US" smtClean="0"/>
               <a:pPr/>
-              <a:t>10/10/2014</a:t>
+              <a:t>10/22/2014</a:t>
             </a:fld>
             <a:endParaRPr lang="en-US"/>
           </a:p>
@@ -2216,7 +2217,7 @@
             <a:fld id="{73396D94-1E99-4A60-98C5-CD1513B04F60}" type="datetimeFigureOut">
               <a:rPr lang="en-US" smtClean="0"/>
               <a:pPr/>
-              <a:t>10/10/2014</a:t>
+              <a:t>10/22/2014</a:t>
             </a:fld>
             <a:endParaRPr lang="en-US"/>
           </a:p>
@@ -2506,7 +2507,7 @@
             <a:fld id="{73396D94-1E99-4A60-98C5-CD1513B04F60}" type="datetimeFigureOut">
               <a:rPr lang="en-US" smtClean="0"/>
               <a:pPr/>
-              <a:t>10/10/2014</a:t>
+              <a:t>10/22/2014</a:t>
             </a:fld>
             <a:endParaRPr lang="en-US"/>
           </a:p>
@@ -3279,7 +3280,7 @@
             <a:fld id="{73396D94-1E99-4A60-98C5-CD1513B04F60}" type="datetimeFigureOut">
               <a:rPr lang="en-US" smtClean="0"/>
               <a:pPr/>
-              <a:t>10/10/2014</a:t>
+              <a:t>10/22/2014</a:t>
             </a:fld>
             <a:endParaRPr lang="en-US"/>
           </a:p>
@@ -3953,11 +3954,7 @@
           <a:p>
             <a:r>
               <a:rPr lang="en-US" dirty="0" smtClean="0"/>
-              <a:t>v. </a:t>
-            </a:r>
-            <a:r>
-              <a:rPr lang="en-US" dirty="0" smtClean="0"/>
-              <a:t>1.3.0</a:t>
+              <a:t>v. 1.3.0</a:t>
             </a:r>
             <a:endParaRPr lang="en-US" dirty="0"/>
           </a:p>
@@ -7028,8 +7025,20 @@
             <a:pPr lvl="1"/>
             <a:r>
               <a:rPr lang="en-US" dirty="0" smtClean="0"/>
-              <a:t>Single-page applications</a:t>
-            </a:r>
+              <a:t>Single-page </a:t>
+            </a:r>
+            <a:r>
+              <a:rPr lang="en-US" dirty="0" smtClean="0"/>
+              <a:t>applications</a:t>
+            </a:r>
+          </a:p>
+          <a:p>
+            <a:pPr lvl="1"/>
+            <a:r>
+              <a:rPr lang="en-US" dirty="0" smtClean="0"/>
+              <a:t>18 Style themes</a:t>
+            </a:r>
+            <a:endParaRPr lang="en-US" dirty="0" smtClean="0"/>
           </a:p>
           <a:p>
             <a:r>
@@ -8981,6 +8990,320 @@
           <a:p>
             <a:r>
               <a:rPr lang="en-US" dirty="0" smtClean="0"/>
+              <a:t>Themes</a:t>
+            </a:r>
+            <a:endParaRPr lang="en-US" dirty="0"/>
+          </a:p>
+        </p:txBody>
+      </p:sp>
+      <p:pic>
+        <p:nvPicPr>
+          <p:cNvPr id="1026" name="Picture 2"/>
+          <p:cNvPicPr>
+            <a:picLocks noChangeAspect="1" noChangeArrowheads="1"/>
+          </p:cNvPicPr>
+          <p:nvPr/>
+        </p:nvPicPr>
+        <p:blipFill>
+          <a:blip r:embed="rId2" cstate="print"/>
+          <a:srcRect/>
+          <a:stretch>
+            <a:fillRect/>
+          </a:stretch>
+        </p:blipFill>
+        <p:spPr bwMode="auto">
+          <a:xfrm>
+            <a:off x="522257" y="1893318"/>
+            <a:ext cx="1181100" cy="3295650"/>
+          </a:xfrm>
+          <a:prstGeom prst="rect">
+            <a:avLst/>
+          </a:prstGeom>
+          <a:noFill/>
+          <a:ln w="9525">
+            <a:solidFill>
+              <a:schemeClr val="accent1"/>
+            </a:solidFill>
+            <a:miter lim="800000"/>
+            <a:headEnd/>
+            <a:tailEnd/>
+          </a:ln>
+        </p:spPr>
+      </p:pic>
+      <p:pic>
+        <p:nvPicPr>
+          <p:cNvPr id="1027" name="Picture 3"/>
+          <p:cNvPicPr>
+            <a:picLocks noChangeAspect="1" noChangeArrowheads="1"/>
+          </p:cNvPicPr>
+          <p:nvPr/>
+        </p:nvPicPr>
+        <p:blipFill>
+          <a:blip r:embed="rId3" cstate="print"/>
+          <a:srcRect/>
+          <a:stretch>
+            <a:fillRect/>
+          </a:stretch>
+        </p:blipFill>
+        <p:spPr bwMode="auto">
+          <a:xfrm>
+            <a:off x="510127" y="5306593"/>
+            <a:ext cx="2809875" cy="885825"/>
+          </a:xfrm>
+          <a:prstGeom prst="rect">
+            <a:avLst/>
+          </a:prstGeom>
+          <a:noFill/>
+          <a:ln w="9525">
+            <a:solidFill>
+              <a:schemeClr val="accent1"/>
+            </a:solidFill>
+            <a:miter lim="800000"/>
+            <a:headEnd/>
+            <a:tailEnd/>
+          </a:ln>
+        </p:spPr>
+      </p:pic>
+      <p:pic>
+        <p:nvPicPr>
+          <p:cNvPr id="1028" name="Picture 4"/>
+          <p:cNvPicPr>
+            <a:picLocks noChangeAspect="1" noChangeArrowheads="1"/>
+          </p:cNvPicPr>
+          <p:nvPr/>
+        </p:nvPicPr>
+        <p:blipFill>
+          <a:blip r:embed="rId4" cstate="print"/>
+          <a:srcRect/>
+          <a:stretch>
+            <a:fillRect/>
+          </a:stretch>
+        </p:blipFill>
+        <p:spPr bwMode="auto">
+          <a:xfrm>
+            <a:off x="5083208" y="4580088"/>
+            <a:ext cx="3862388" cy="1971675"/>
+          </a:xfrm>
+          <a:prstGeom prst="rect">
+            <a:avLst/>
+          </a:prstGeom>
+          <a:noFill/>
+          <a:ln w="9525">
+            <a:solidFill>
+              <a:schemeClr val="accent1"/>
+            </a:solidFill>
+            <a:miter lim="800000"/>
+            <a:headEnd/>
+            <a:tailEnd/>
+          </a:ln>
+        </p:spPr>
+      </p:pic>
+      <p:pic>
+        <p:nvPicPr>
+          <p:cNvPr id="1029" name="Picture 5"/>
+          <p:cNvPicPr>
+            <a:picLocks noChangeAspect="1" noChangeArrowheads="1"/>
+          </p:cNvPicPr>
+          <p:nvPr/>
+        </p:nvPicPr>
+        <p:blipFill>
+          <a:blip r:embed="rId5" cstate="print"/>
+          <a:srcRect/>
+          <a:stretch>
+            <a:fillRect/>
+          </a:stretch>
+        </p:blipFill>
+        <p:spPr bwMode="auto">
+          <a:xfrm>
+            <a:off x="5091832" y="284134"/>
+            <a:ext cx="3862388" cy="1971675"/>
+          </a:xfrm>
+          <a:prstGeom prst="rect">
+            <a:avLst/>
+          </a:prstGeom>
+          <a:noFill/>
+          <a:ln w="9525">
+            <a:solidFill>
+              <a:schemeClr val="accent1"/>
+            </a:solidFill>
+            <a:miter lim="800000"/>
+            <a:headEnd/>
+            <a:tailEnd/>
+          </a:ln>
+        </p:spPr>
+      </p:pic>
+      <p:pic>
+        <p:nvPicPr>
+          <p:cNvPr id="1030" name="Picture 6"/>
+          <p:cNvPicPr>
+            <a:picLocks noChangeAspect="1" noChangeArrowheads="1"/>
+          </p:cNvPicPr>
+          <p:nvPr/>
+        </p:nvPicPr>
+        <p:blipFill>
+          <a:blip r:embed="rId6" cstate="print"/>
+          <a:srcRect/>
+          <a:stretch>
+            <a:fillRect/>
+          </a:stretch>
+        </p:blipFill>
+        <p:spPr bwMode="auto">
+          <a:xfrm>
+            <a:off x="5083206" y="2414859"/>
+            <a:ext cx="3862388" cy="1971675"/>
+          </a:xfrm>
+          <a:prstGeom prst="rect">
+            <a:avLst/>
+          </a:prstGeom>
+          <a:noFill/>
+          <a:ln w="9525">
+            <a:solidFill>
+              <a:schemeClr val="accent1"/>
+            </a:solidFill>
+            <a:miter lim="800000"/>
+            <a:headEnd/>
+            <a:tailEnd/>
+          </a:ln>
+        </p:spPr>
+      </p:pic>
+      <p:cxnSp>
+        <p:nvCxnSpPr>
+          <p:cNvPr id="11" name="Straight Connector 10"/>
+          <p:cNvCxnSpPr>
+            <a:endCxn id="1029" idx="1"/>
+          </p:cNvCxnSpPr>
+          <p:nvPr/>
+        </p:nvCxnSpPr>
+        <p:spPr>
+          <a:xfrm flipV="1">
+            <a:off x="1423358" y="1269972"/>
+            <a:ext cx="3668474" cy="1430096"/>
+          </a:xfrm>
+          <a:prstGeom prst="line">
+            <a:avLst/>
+          </a:prstGeom>
+        </p:spPr>
+        <p:style>
+          <a:lnRef idx="1">
+            <a:schemeClr val="accent1"/>
+          </a:lnRef>
+          <a:fillRef idx="0">
+            <a:schemeClr val="accent1"/>
+          </a:fillRef>
+          <a:effectRef idx="0">
+            <a:schemeClr val="accent1"/>
+          </a:effectRef>
+          <a:fontRef idx="minor">
+            <a:schemeClr val="tx1"/>
+          </a:fontRef>
+        </p:style>
+      </p:cxnSp>
+      <p:cxnSp>
+        <p:nvCxnSpPr>
+          <p:cNvPr id="13" name="Straight Connector 12"/>
+          <p:cNvCxnSpPr>
+            <a:endCxn id="1030" idx="1"/>
+          </p:cNvCxnSpPr>
+          <p:nvPr/>
+        </p:nvCxnSpPr>
+        <p:spPr>
+          <a:xfrm flipV="1">
+            <a:off x="1544128" y="3400697"/>
+            <a:ext cx="3539078" cy="489817"/>
+          </a:xfrm>
+          <a:prstGeom prst="line">
+            <a:avLst/>
+          </a:prstGeom>
+        </p:spPr>
+        <p:style>
+          <a:lnRef idx="1">
+            <a:schemeClr val="accent1"/>
+          </a:lnRef>
+          <a:fillRef idx="0">
+            <a:schemeClr val="accent1"/>
+          </a:fillRef>
+          <a:effectRef idx="0">
+            <a:schemeClr val="accent1"/>
+          </a:effectRef>
+          <a:fontRef idx="minor">
+            <a:schemeClr val="tx1"/>
+          </a:fontRef>
+        </p:style>
+      </p:cxnSp>
+      <p:cxnSp>
+        <p:nvCxnSpPr>
+          <p:cNvPr id="16" name="Straight Connector 15"/>
+          <p:cNvCxnSpPr>
+            <a:endCxn id="1028" idx="1"/>
+          </p:cNvCxnSpPr>
+          <p:nvPr/>
+        </p:nvCxnSpPr>
+        <p:spPr>
+          <a:xfrm>
+            <a:off x="1621766" y="4063042"/>
+            <a:ext cx="3461442" cy="1502884"/>
+          </a:xfrm>
+          <a:prstGeom prst="line">
+            <a:avLst/>
+          </a:prstGeom>
+        </p:spPr>
+        <p:style>
+          <a:lnRef idx="1">
+            <a:schemeClr val="accent1"/>
+          </a:lnRef>
+          <a:fillRef idx="0">
+            <a:schemeClr val="accent1"/>
+          </a:fillRef>
+          <a:effectRef idx="0">
+            <a:schemeClr val="accent1"/>
+          </a:effectRef>
+          <a:fontRef idx="minor">
+            <a:schemeClr val="tx1"/>
+          </a:fontRef>
+        </p:style>
+      </p:cxnSp>
+    </p:spTree>
+  </p:cSld>
+  <p:clrMapOvr>
+    <a:masterClrMapping/>
+  </p:clrMapOvr>
+</p:sld>
+</file>
+
+<file path=ppt/slides/slide29.xml><?xml version="1.0" encoding="utf-8"?>
+<p:sld xmlns:a="http://schemas.openxmlformats.org/drawingml/2006/main" xmlns:r="http://schemas.openxmlformats.org/officeDocument/2006/relationships" xmlns:p="http://schemas.openxmlformats.org/presentationml/2006/main">
+  <p:cSld>
+    <p:spTree>
+      <p:nvGrpSpPr>
+        <p:cNvPr id="1" name=""/>
+        <p:cNvGrpSpPr/>
+        <p:nvPr/>
+      </p:nvGrpSpPr>
+      <p:grpSpPr>
+        <a:xfrm>
+          <a:off x="0" y="0"/>
+          <a:ext cx="0" cy="0"/>
+          <a:chOff x="0" y="0"/>
+          <a:chExt cx="0" cy="0"/>
+        </a:xfrm>
+      </p:grpSpPr>
+      <p:sp>
+        <p:nvSpPr>
+          <p:cNvPr id="2" name="Title 1"/>
+          <p:cNvSpPr>
+            <a:spLocks noGrp="1"/>
+          </p:cNvSpPr>
+          <p:nvPr>
+            <p:ph type="title"/>
+          </p:nvPr>
+        </p:nvSpPr>
+        <p:spPr/>
+        <p:txBody>
+          <a:bodyPr/>
+          <a:lstStyle/>
+          <a:p>
+            <a:r>
+              <a:rPr lang="en-US" dirty="0" smtClean="0"/>
               <a:t>References</a:t>
             </a:r>
             <a:endParaRPr lang="en-US" dirty="0"/>
@@ -9012,19 +9335,12 @@
               <a:rPr lang="en-US" sz="1200" dirty="0" smtClean="0">
                 <a:hlinkClick r:id="rId2"/>
               </a:rPr>
-              <a:t>https://</a:t>
-            </a:r>
-            <a:r>
-              <a:rPr lang="en-US" sz="1200" dirty="0" smtClean="0">
-                <a:hlinkClick r:id="rId2"/>
-              </a:rPr>
-              <a:t>github.com/Nasdanika/server/wiki/html</a:t>
+              <a:t>https://github.com/Nasdanika/server/wiki/html</a:t>
             </a:r>
             <a:r>
               <a:rPr lang="en-US" dirty="0" smtClean="0"/>
               <a:t> </a:t>
             </a:r>
-            <a:endParaRPr lang="en-US" dirty="0" smtClean="0"/>
           </a:p>
           <a:p>
             <a:r>
@@ -9051,13 +9367,7 @@
               <a:rPr lang="en-US" sz="2400" i="1" dirty="0" smtClean="0">
                 <a:latin typeface="+mj-lt"/>
               </a:rPr>
-              <a:t> HTML and shows </a:t>
-            </a:r>
-            <a:r>
-              <a:rPr lang="en-US" sz="2400" i="1" dirty="0" smtClean="0">
-                <a:latin typeface="+mj-lt"/>
-              </a:rPr>
-              <a:t>screenshots of the application also generated with </a:t>
+              <a:t> HTML and shows screenshots of the application also generated with </a:t>
             </a:r>
             <a:r>
               <a:rPr lang="en-US" sz="2400" i="1" dirty="0" err="1" smtClean="0">
@@ -9079,19 +9389,12 @@
               <a:rPr lang="en-US" sz="1200" dirty="0" smtClean="0">
                 <a:hlinkClick r:id="rId3"/>
               </a:rPr>
-              <a:t>http://www.nasdanika.org/examples/test-report</a:t>
-            </a:r>
-            <a:r>
-              <a:rPr lang="en-US" sz="1200" dirty="0" smtClean="0">
-                <a:hlinkClick r:id="rId3"/>
-              </a:rPr>
-              <a:t>/</a:t>
+              <a:t>http://www.nasdanika.org/examples/test-report/</a:t>
             </a:r>
             <a:r>
               <a:rPr lang="en-US" dirty="0" smtClean="0"/>
               <a:t> </a:t>
             </a:r>
-            <a:endParaRPr lang="en-US" dirty="0" smtClean="0"/>
           </a:p>
           <a:p>
             <a:r>
@@ -9102,13 +9405,7 @@
               <a:rPr lang="en-US" sz="1200" dirty="0" smtClean="0">
                 <a:hlinkClick r:id="rId4"/>
               </a:rPr>
-              <a:t>https</a:t>
-            </a:r>
-            <a:r>
-              <a:rPr lang="en-US" sz="1200" dirty="0" smtClean="0">
-                <a:hlinkClick r:id="rId4"/>
-              </a:rPr>
-              <a:t>://github.com/Nasdanika/server/tree/master/org.nasdanika.html</a:t>
+              <a:t>https://github.com/Nasdanika/server/tree/master/org.nasdanika.html</a:t>
             </a:r>
             <a:r>
               <a:rPr lang="en-US" sz="1400" dirty="0" smtClean="0"/>
@@ -9128,28 +9425,17 @@
               <a:rPr lang="en-US" sz="1200" dirty="0" smtClean="0">
                 <a:hlinkClick r:id="rId5"/>
               </a:rPr>
-              <a:t>http://</a:t>
-            </a:r>
-            <a:r>
-              <a:rPr lang="en-US" sz="1200" dirty="0" smtClean="0">
-                <a:hlinkClick r:id="rId5"/>
-              </a:rPr>
-              <a:t>www.nasdanika.org/server/apidocs/org/nasdanika/html/package-summary.html</a:t>
+              <a:t>http://www.nasdanika.org/server/apidocs/org/nasdanika/html/package-summary.html</a:t>
             </a:r>
             <a:r>
               <a:rPr lang="en-US" dirty="0" smtClean="0"/>
               <a:t>  </a:t>
             </a:r>
-            <a:endParaRPr lang="en-US" dirty="0" smtClean="0"/>
           </a:p>
           <a:p>
             <a:r>
               <a:rPr lang="en-US" dirty="0" smtClean="0"/>
-              <a:t>Bootstrap </a:t>
-            </a:r>
-            <a:r>
-              <a:rPr lang="en-US" dirty="0" smtClean="0"/>
-              <a:t>themes - </a:t>
+              <a:t>Bootstrap themes - </a:t>
             </a:r>
             <a:r>
               <a:rPr lang="en-US" sz="1200" dirty="0" smtClean="0">
@@ -9166,11 +9452,7 @@
             </a:r>
             <a:r>
               <a:rPr lang="en-US" dirty="0" smtClean="0"/>
-              <a:t> </a:t>
-            </a:r>
-            <a:r>
-              <a:rPr lang="en-US" dirty="0" smtClean="0"/>
-              <a:t>Foundation Server presentation - </a:t>
+              <a:t> Foundation Server presentation - </a:t>
             </a:r>
             <a:r>
               <a:rPr lang="en-US" sz="1200" dirty="0" smtClean="0">

</xml_diff>

<commit_message>
Font Awesome and Angular support.
</commit_message>
<xml_diff>
--- a/Nasdanika HTML.pptx
+++ b/Nasdanika HTML.pptx
@@ -27,13 +27,14 @@
     <p:sldId id="272" r:id="rId21"/>
     <p:sldId id="274" r:id="rId22"/>
     <p:sldId id="283" r:id="rId23"/>
-    <p:sldId id="275" r:id="rId24"/>
-    <p:sldId id="276" r:id="rId25"/>
-    <p:sldId id="280" r:id="rId26"/>
-    <p:sldId id="281" r:id="rId27"/>
-    <p:sldId id="282" r:id="rId28"/>
-    <p:sldId id="284" r:id="rId29"/>
-    <p:sldId id="277" r:id="rId30"/>
+    <p:sldId id="285" r:id="rId24"/>
+    <p:sldId id="275" r:id="rId25"/>
+    <p:sldId id="276" r:id="rId26"/>
+    <p:sldId id="280" r:id="rId27"/>
+    <p:sldId id="281" r:id="rId28"/>
+    <p:sldId id="282" r:id="rId29"/>
+    <p:sldId id="284" r:id="rId30"/>
+    <p:sldId id="277" r:id="rId31"/>
   </p:sldIdLst>
   <p:sldSz cx="9144000" cy="6858000" type="screen4x3"/>
   <p:notesSz cx="6858000" cy="9144000"/>
@@ -309,7 +310,7 @@
             <a:fld id="{73396D94-1E99-4A60-98C5-CD1513B04F60}" type="datetimeFigureOut">
               <a:rPr lang="en-US" smtClean="0"/>
               <a:pPr/>
-              <a:t>10/22/2014</a:t>
+              <a:t>11/21/2014</a:t>
             </a:fld>
             <a:endParaRPr lang="en-US"/>
           </a:p>
@@ -476,7 +477,7 @@
             <a:fld id="{73396D94-1E99-4A60-98C5-CD1513B04F60}" type="datetimeFigureOut">
               <a:rPr lang="en-US" smtClean="0"/>
               <a:pPr/>
-              <a:t>10/22/2014</a:t>
+              <a:t>11/21/2014</a:t>
             </a:fld>
             <a:endParaRPr lang="en-US"/>
           </a:p>
@@ -653,7 +654,7 @@
             <a:fld id="{73396D94-1E99-4A60-98C5-CD1513B04F60}" type="datetimeFigureOut">
               <a:rPr lang="en-US" smtClean="0"/>
               <a:pPr/>
-              <a:t>10/22/2014</a:t>
+              <a:t>11/21/2014</a:t>
             </a:fld>
             <a:endParaRPr lang="en-US"/>
           </a:p>
@@ -820,7 +821,7 @@
             <a:fld id="{73396D94-1E99-4A60-98C5-CD1513B04F60}" type="datetimeFigureOut">
               <a:rPr lang="en-US" smtClean="0"/>
               <a:pPr/>
-              <a:t>10/22/2014</a:t>
+              <a:t>11/21/2014</a:t>
             </a:fld>
             <a:endParaRPr lang="en-US"/>
           </a:p>
@@ -1064,7 +1065,7 @@
             <a:fld id="{73396D94-1E99-4A60-98C5-CD1513B04F60}" type="datetimeFigureOut">
               <a:rPr lang="en-US" smtClean="0"/>
               <a:pPr/>
-              <a:t>10/22/2014</a:t>
+              <a:t>11/21/2014</a:t>
             </a:fld>
             <a:endParaRPr lang="en-US"/>
           </a:p>
@@ -1330,7 +1331,7 @@
             <a:fld id="{73396D94-1E99-4A60-98C5-CD1513B04F60}" type="datetimeFigureOut">
               <a:rPr lang="en-US" smtClean="0"/>
               <a:pPr/>
-              <a:t>10/22/2014</a:t>
+              <a:t>11/21/2014</a:t>
             </a:fld>
             <a:endParaRPr lang="en-US"/>
           </a:p>
@@ -1710,7 +1711,7 @@
             <a:fld id="{73396D94-1E99-4A60-98C5-CD1513B04F60}" type="datetimeFigureOut">
               <a:rPr lang="en-US" smtClean="0"/>
               <a:pPr/>
-              <a:t>10/22/2014</a:t>
+              <a:t>11/21/2014</a:t>
             </a:fld>
             <a:endParaRPr lang="en-US"/>
           </a:p>
@@ -1862,7 +1863,7 @@
             <a:fld id="{73396D94-1E99-4A60-98C5-CD1513B04F60}" type="datetimeFigureOut">
               <a:rPr lang="en-US" smtClean="0"/>
               <a:pPr/>
-              <a:t>10/22/2014</a:t>
+              <a:t>11/21/2014</a:t>
             </a:fld>
             <a:endParaRPr lang="en-US"/>
           </a:p>
@@ -1954,7 +1955,7 @@
             <a:fld id="{73396D94-1E99-4A60-98C5-CD1513B04F60}" type="datetimeFigureOut">
               <a:rPr lang="en-US" smtClean="0"/>
               <a:pPr/>
-              <a:t>10/22/2014</a:t>
+              <a:t>11/21/2014</a:t>
             </a:fld>
             <a:endParaRPr lang="en-US"/>
           </a:p>
@@ -2217,7 +2218,7 @@
             <a:fld id="{73396D94-1E99-4A60-98C5-CD1513B04F60}" type="datetimeFigureOut">
               <a:rPr lang="en-US" smtClean="0"/>
               <a:pPr/>
-              <a:t>10/22/2014</a:t>
+              <a:t>11/21/2014</a:t>
             </a:fld>
             <a:endParaRPr lang="en-US"/>
           </a:p>
@@ -2507,7 +2508,7 @@
             <a:fld id="{73396D94-1E99-4A60-98C5-CD1513B04F60}" type="datetimeFigureOut">
               <a:rPr lang="en-US" smtClean="0"/>
               <a:pPr/>
-              <a:t>10/22/2014</a:t>
+              <a:t>11/21/2014</a:t>
             </a:fld>
             <a:endParaRPr lang="en-US"/>
           </a:p>
@@ -3280,7 +3281,7 @@
             <a:fld id="{73396D94-1E99-4A60-98C5-CD1513B04F60}" type="datetimeFigureOut">
               <a:rPr lang="en-US" smtClean="0"/>
               <a:pPr/>
-              <a:t>10/22/2014</a:t>
+              <a:t>11/21/2014</a:t>
             </a:fld>
             <a:endParaRPr lang="en-US"/>
           </a:p>
@@ -7018,18 +7019,35 @@
             <a:pPr lvl="1"/>
             <a:r>
               <a:rPr lang="en-US" dirty="0" smtClean="0"/>
-              <a:t>High level - Bootstrap UI elements</a:t>
+              <a:t>High level: </a:t>
+            </a:r>
+          </a:p>
+          <a:p>
+            <a:pPr lvl="2"/>
+            <a:r>
+              <a:rPr lang="en-US" dirty="0" smtClean="0"/>
+              <a:t>Bootstrap UI elements</a:t>
+            </a:r>
+          </a:p>
+          <a:p>
+            <a:pPr lvl="2"/>
+            <a:r>
+              <a:rPr lang="en-US" dirty="0" smtClean="0"/>
+              <a:t>Font Awesome icons</a:t>
+            </a:r>
+          </a:p>
+          <a:p>
+            <a:pPr lvl="2"/>
+            <a:r>
+              <a:rPr lang="en-US" dirty="0" smtClean="0"/>
+              <a:t>Angular directives</a:t>
             </a:r>
           </a:p>
           <a:p>
             <a:pPr lvl="1"/>
             <a:r>
               <a:rPr lang="en-US" dirty="0" smtClean="0"/>
-              <a:t>Single-page </a:t>
-            </a:r>
-            <a:r>
-              <a:rPr lang="en-US" dirty="0" smtClean="0"/>
-              <a:t>applications</a:t>
+              <a:t>Single-page applications</a:t>
             </a:r>
           </a:p>
           <a:p>
@@ -7038,19 +7056,11 @@
               <a:rPr lang="en-US" dirty="0" smtClean="0"/>
               <a:t>18 Style themes</a:t>
             </a:r>
-            <a:endParaRPr lang="en-US" dirty="0" smtClean="0"/>
           </a:p>
           <a:p>
             <a:r>
               <a:rPr lang="en-US" dirty="0" smtClean="0"/>
               <a:t>Sources: </a:t>
-            </a:r>
-          </a:p>
-          <a:p>
-            <a:pPr lvl="1"/>
-            <a:r>
-              <a:rPr lang="en-US" sz="1400" dirty="0" smtClean="0"/>
-              <a:t>Master - </a:t>
             </a:r>
             <a:r>
               <a:rPr lang="en-US" sz="1400" dirty="0" smtClean="0">
@@ -7059,24 +7069,6 @@
               <a:t>https://github.com/pvlasov/nasdanika/tree/master/org.nasdanika.html</a:t>
             </a:r>
             <a:endParaRPr lang="en-US" sz="1400" dirty="0" smtClean="0"/>
-          </a:p>
-          <a:p>
-            <a:pPr lvl="1"/>
-            <a:r>
-              <a:rPr lang="en-US" sz="1400" dirty="0" smtClean="0"/>
-              <a:t>Release  1.2.0 - </a:t>
-            </a:r>
-            <a:r>
-              <a:rPr lang="en-US" sz="1400" dirty="0" smtClean="0">
-                <a:hlinkClick r:id="rId3"/>
-              </a:rPr>
-              <a:t>https://github.com/pvlasov/nasdanika/releases/tag/html-1.2.0</a:t>
-            </a:r>
-            <a:r>
-              <a:rPr lang="en-US" sz="1400" dirty="0" smtClean="0"/>
-              <a:t> </a:t>
-            </a:r>
-            <a:endParaRPr lang="en-US" dirty="0"/>
           </a:p>
         </p:txBody>
       </p:sp>
@@ -7089,7 +7081,7 @@
           <p:nvPr/>
         </p:nvPicPr>
         <p:blipFill>
-          <a:blip r:embed="rId4" cstate="print"/>
+          <a:blip r:embed="rId3" cstate="print"/>
           <a:srcRect/>
           <a:stretch>
             <a:fillRect/>
@@ -7744,190 +7736,15 @@
           <a:p>
             <a:r>
               <a:rPr lang="en-US" dirty="0" smtClean="0"/>
-              <a:t>Dynamic content</a:t>
+              <a:t>Font Awesome</a:t>
             </a:r>
             <a:endParaRPr lang="en-US" dirty="0"/>
-          </a:p>
-        </p:txBody>
-      </p:sp>
-      <p:sp>
-        <p:nvSpPr>
-          <p:cNvPr id="3" name="Content Placeholder 2"/>
-          <p:cNvSpPr>
-            <a:spLocks noGrp="1"/>
-          </p:cNvSpPr>
-          <p:nvPr>
-            <p:ph idx="1"/>
-          </p:nvPr>
-        </p:nvSpPr>
-        <p:spPr>
-          <a:xfrm>
-            <a:off x="457200" y="1935480"/>
-            <a:ext cx="8350370" cy="4389120"/>
-          </a:xfrm>
-        </p:spPr>
-        <p:txBody>
-          <a:bodyPr>
-            <a:normAutofit/>
-          </a:bodyPr>
-          <a:lstStyle/>
-          <a:p>
-            <a:r>
-              <a:rPr lang="en-US" sz="2000" dirty="0" smtClean="0"/>
-              <a:t>Content’s </a:t>
-            </a:r>
-            <a:r>
-              <a:rPr lang="en-US" sz="2000" dirty="0" err="1" smtClean="0">
-                <a:latin typeface="Courier New" pitchFamily="49" charset="0"/>
-                <a:cs typeface="Courier New" pitchFamily="49" charset="0"/>
-              </a:rPr>
-              <a:t>toString</a:t>
-            </a:r>
-            <a:r>
-              <a:rPr lang="en-US" sz="2000" dirty="0" smtClean="0">
-                <a:latin typeface="Courier New" pitchFamily="49" charset="0"/>
-                <a:cs typeface="Courier New" pitchFamily="49" charset="0"/>
-              </a:rPr>
-              <a:t>()</a:t>
-            </a:r>
-            <a:r>
-              <a:rPr lang="en-US" sz="2000" dirty="0" smtClean="0"/>
-              <a:t> is invoked every time component’s </a:t>
-            </a:r>
-            <a:r>
-              <a:rPr lang="en-US" sz="2000" dirty="0" err="1" smtClean="0">
-                <a:latin typeface="Courier New" pitchFamily="49" charset="0"/>
-                <a:cs typeface="Courier New" pitchFamily="49" charset="0"/>
-              </a:rPr>
-              <a:t>toString</a:t>
-            </a:r>
-            <a:r>
-              <a:rPr lang="en-US" sz="2000" dirty="0" smtClean="0">
-                <a:latin typeface="Courier New" pitchFamily="49" charset="0"/>
-                <a:cs typeface="Courier New" pitchFamily="49" charset="0"/>
-              </a:rPr>
-              <a:t>()</a:t>
-            </a:r>
-            <a:r>
-              <a:rPr lang="en-US" sz="2000" dirty="0" smtClean="0"/>
-              <a:t> is invoked.</a:t>
-            </a:r>
-          </a:p>
-          <a:p>
-            <a:r>
-              <a:rPr lang="en-US" sz="2000" dirty="0" smtClean="0"/>
-              <a:t>Therefore assembled components may be reused and will fetch fresh data every time their </a:t>
-            </a:r>
-            <a:r>
-              <a:rPr lang="en-US" sz="2000" dirty="0" err="1" smtClean="0">
-                <a:latin typeface="Courier New" pitchFamily="49" charset="0"/>
-                <a:cs typeface="Courier New" pitchFamily="49" charset="0"/>
-              </a:rPr>
-              <a:t>toString</a:t>
-            </a:r>
-            <a:r>
-              <a:rPr lang="en-US" sz="2000" dirty="0" smtClean="0">
-                <a:latin typeface="Courier New" pitchFamily="49" charset="0"/>
-                <a:cs typeface="Courier New" pitchFamily="49" charset="0"/>
-              </a:rPr>
-              <a:t>()</a:t>
-            </a:r>
-            <a:r>
-              <a:rPr lang="en-US" sz="2000" dirty="0" smtClean="0"/>
-              <a:t> is invoked.</a:t>
-            </a:r>
-          </a:p>
-          <a:p>
-            <a:r>
-              <a:rPr lang="en-US" sz="2000" dirty="0" err="1" smtClean="0">
-                <a:latin typeface="Courier New" pitchFamily="49" charset="0"/>
-                <a:cs typeface="Courier New" pitchFamily="49" charset="0"/>
-              </a:rPr>
-              <a:t>AutoCloseable</a:t>
-            </a:r>
-            <a:r>
-              <a:rPr lang="en-US" sz="2000" dirty="0" smtClean="0"/>
-              <a:t> content is closed when component is closed.</a:t>
-            </a:r>
-          </a:p>
-          <a:p>
-            <a:r>
-              <a:rPr lang="en-US" sz="2000" dirty="0" smtClean="0"/>
-              <a:t>Example: </a:t>
-            </a:r>
-          </a:p>
-          <a:p>
-            <a:pPr lvl="1"/>
-            <a:r>
-              <a:rPr lang="en-US" sz="1800" dirty="0" smtClean="0"/>
-              <a:t>Assemble user UI from preferences and metadata.</a:t>
-            </a:r>
-          </a:p>
-          <a:p>
-            <a:pPr lvl="1"/>
-            <a:r>
-              <a:rPr lang="en-US" sz="1800" dirty="0" smtClean="0"/>
-              <a:t>Wire dynamic content sources.</a:t>
-            </a:r>
-          </a:p>
-          <a:p>
-            <a:pPr lvl="1"/>
-            <a:r>
-              <a:rPr lang="en-US" sz="1800" dirty="0" smtClean="0"/>
-              <a:t>Store in user session.</a:t>
-            </a:r>
-          </a:p>
-          <a:p>
-            <a:pPr lvl="1"/>
-            <a:r>
-              <a:rPr lang="en-US" sz="1800" dirty="0" smtClean="0"/>
-              <a:t>Close UI top component when session closes.</a:t>
-            </a:r>
-          </a:p>
-          <a:p>
-            <a:pPr lvl="2"/>
-            <a:r>
-              <a:rPr lang="en-US" sz="1500" dirty="0" smtClean="0">
-                <a:latin typeface="Courier New" pitchFamily="49" charset="0"/>
-                <a:cs typeface="Courier New" pitchFamily="49" charset="0"/>
-              </a:rPr>
-              <a:t>close()</a:t>
-            </a:r>
-            <a:r>
-              <a:rPr lang="en-US" sz="1500" dirty="0" smtClean="0">
-                <a:cs typeface="Courier New" pitchFamily="49" charset="0"/>
-              </a:rPr>
-              <a:t> </a:t>
-            </a:r>
-            <a:r>
-              <a:rPr lang="en-US" sz="1500" dirty="0" smtClean="0"/>
-              <a:t>will traverse down to </a:t>
-            </a:r>
-            <a:r>
-              <a:rPr lang="en-US" sz="1500" dirty="0" err="1" smtClean="0">
-                <a:latin typeface="Courier New" pitchFamily="49" charset="0"/>
-                <a:cs typeface="Courier New" pitchFamily="49" charset="0"/>
-              </a:rPr>
-              <a:t>AutoCloseable</a:t>
-            </a:r>
-            <a:r>
-              <a:rPr lang="en-US" sz="1500" dirty="0" smtClean="0"/>
-              <a:t> </a:t>
-            </a:r>
-            <a:br>
-              <a:rPr lang="en-US" sz="1500" dirty="0" smtClean="0"/>
-            </a:br>
-            <a:r>
-              <a:rPr lang="en-US" sz="1500" dirty="0" smtClean="0"/>
-              <a:t>dynamic content and close it.</a:t>
-            </a:r>
-            <a:endParaRPr lang="en-US" sz="1500" dirty="0"/>
           </a:p>
         </p:txBody>
       </p:sp>
       <p:pic>
         <p:nvPicPr>
-          <p:cNvPr id="18437" name="Picture 5"/>
+          <p:cNvPr id="1026" name="Picture 2"/>
           <p:cNvPicPr>
             <a:picLocks noChangeAspect="1" noChangeArrowheads="1"/>
           </p:cNvPicPr>
@@ -7942,8 +7759,8 @@
         </p:blipFill>
         <p:spPr bwMode="auto">
           <a:xfrm>
-            <a:off x="5804319" y="4471000"/>
-            <a:ext cx="2900363" cy="2085975"/>
+            <a:off x="459016" y="1786855"/>
+            <a:ext cx="2490458" cy="4937096"/>
           </a:xfrm>
           <a:prstGeom prst="rect">
             <a:avLst/>
@@ -7951,7 +7768,7 @@
           <a:noFill/>
           <a:ln w="9525">
             <a:solidFill>
-              <a:schemeClr val="tx2"/>
+              <a:schemeClr val="accent1"/>
             </a:solidFill>
             <a:miter lim="800000"/>
             <a:headEnd/>
@@ -7959,11 +7776,358 @@
           </a:ln>
         </p:spPr>
       </p:pic>
+      <p:pic>
+        <p:nvPicPr>
+          <p:cNvPr id="1027" name="Picture 3"/>
+          <p:cNvPicPr>
+            <a:picLocks noChangeAspect="1" noChangeArrowheads="1"/>
+          </p:cNvPicPr>
+          <p:nvPr/>
+        </p:nvPicPr>
+        <p:blipFill>
+          <a:blip r:embed="rId3" cstate="print"/>
+          <a:srcRect/>
+          <a:stretch>
+            <a:fillRect/>
+          </a:stretch>
+        </p:blipFill>
+        <p:spPr bwMode="auto">
+          <a:xfrm>
+            <a:off x="3059710" y="4382942"/>
+            <a:ext cx="5849398" cy="2326121"/>
+          </a:xfrm>
+          <a:prstGeom prst="rect">
+            <a:avLst/>
+          </a:prstGeom>
+          <a:noFill/>
+          <a:ln w="9525">
+            <a:solidFill>
+              <a:schemeClr val="accent1"/>
+            </a:solidFill>
+            <a:miter lim="800000"/>
+            <a:headEnd/>
+            <a:tailEnd/>
+          </a:ln>
+        </p:spPr>
+      </p:pic>
+      <p:pic>
+        <p:nvPicPr>
+          <p:cNvPr id="3" name="Picture 2"/>
+          <p:cNvPicPr>
+            <a:picLocks noChangeAspect="1" noChangeArrowheads="1"/>
+          </p:cNvPicPr>
+          <p:nvPr/>
+        </p:nvPicPr>
+        <p:blipFill>
+          <a:blip r:embed="rId4" cstate="print"/>
+          <a:srcRect/>
+          <a:stretch>
+            <a:fillRect/>
+          </a:stretch>
+        </p:blipFill>
+        <p:spPr bwMode="auto">
+          <a:xfrm>
+            <a:off x="6604575" y="802257"/>
+            <a:ext cx="2421081" cy="3467818"/>
+          </a:xfrm>
+          <a:prstGeom prst="rect">
+            <a:avLst/>
+          </a:prstGeom>
+          <a:noFill/>
+          <a:ln w="9525">
+            <a:noFill/>
+            <a:miter lim="800000"/>
+            <a:headEnd/>
+            <a:tailEnd/>
+          </a:ln>
+        </p:spPr>
+      </p:pic>
+      <p:sp>
+        <p:nvSpPr>
+          <p:cNvPr id="6" name="Rounded Rectangle 5"/>
+          <p:cNvSpPr/>
+          <p:nvPr/>
+        </p:nvSpPr>
+        <p:spPr>
+          <a:xfrm>
+            <a:off x="6702725" y="3200400"/>
+            <a:ext cx="2199735" cy="543464"/>
+          </a:xfrm>
+          <a:prstGeom prst="roundRect">
+            <a:avLst/>
+          </a:prstGeom>
+          <a:noFill/>
+        </p:spPr>
+        <p:style>
+          <a:lnRef idx="2">
+            <a:schemeClr val="accent1">
+              <a:shade val="50000"/>
+            </a:schemeClr>
+          </a:lnRef>
+          <a:fillRef idx="1">
+            <a:schemeClr val="accent1"/>
+          </a:fillRef>
+          <a:effectRef idx="0">
+            <a:schemeClr val="accent1"/>
+          </a:effectRef>
+          <a:fontRef idx="minor">
+            <a:schemeClr val="lt1"/>
+          </a:fontRef>
+        </p:style>
+        <p:txBody>
+          <a:bodyPr rtlCol="0" anchor="ctr"/>
+          <a:lstStyle/>
+          <a:p>
+            <a:pPr algn="ctr"/>
+            <a:endParaRPr lang="en-US"/>
+          </a:p>
+        </p:txBody>
+      </p:sp>
+      <p:sp>
+        <p:nvSpPr>
+          <p:cNvPr id="7" name="Bent Arrow 6"/>
+          <p:cNvSpPr/>
+          <p:nvPr/>
+        </p:nvSpPr>
+        <p:spPr>
+          <a:xfrm>
+            <a:off x="5210355" y="3183147"/>
+            <a:ext cx="1457864" cy="1173193"/>
+          </a:xfrm>
+          <a:prstGeom prst="bentArrow">
+            <a:avLst/>
+          </a:prstGeom>
+        </p:spPr>
+        <p:style>
+          <a:lnRef idx="2">
+            <a:schemeClr val="accent1">
+              <a:shade val="50000"/>
+            </a:schemeClr>
+          </a:lnRef>
+          <a:fillRef idx="1">
+            <a:schemeClr val="accent1"/>
+          </a:fillRef>
+          <a:effectRef idx="0">
+            <a:schemeClr val="accent1"/>
+          </a:effectRef>
+          <a:fontRef idx="minor">
+            <a:schemeClr val="lt1"/>
+          </a:fontRef>
+        </p:style>
+        <p:txBody>
+          <a:bodyPr rtlCol="0" anchor="ctr"/>
+          <a:lstStyle/>
+          <a:p>
+            <a:pPr algn="ctr"/>
+            <a:endParaRPr lang="en-US">
+              <a:solidFill>
+                <a:schemeClr val="tx1"/>
+              </a:solidFill>
+            </a:endParaRPr>
+          </a:p>
+        </p:txBody>
+      </p:sp>
+      <p:sp>
+        <p:nvSpPr>
+          <p:cNvPr id="8" name="Rounded Rectangle 7"/>
+          <p:cNvSpPr/>
+          <p:nvPr/>
+        </p:nvSpPr>
+        <p:spPr>
+          <a:xfrm>
+            <a:off x="3847381" y="6547449"/>
+            <a:ext cx="4968815" cy="138023"/>
+          </a:xfrm>
+          <a:prstGeom prst="roundRect">
+            <a:avLst/>
+          </a:prstGeom>
+          <a:noFill/>
+        </p:spPr>
+        <p:style>
+          <a:lnRef idx="2">
+            <a:schemeClr val="accent1">
+              <a:shade val="50000"/>
+            </a:schemeClr>
+          </a:lnRef>
+          <a:fillRef idx="1">
+            <a:schemeClr val="accent1"/>
+          </a:fillRef>
+          <a:effectRef idx="0">
+            <a:schemeClr val="accent1"/>
+          </a:effectRef>
+          <a:fontRef idx="minor">
+            <a:schemeClr val="lt1"/>
+          </a:fontRef>
+        </p:style>
+        <p:txBody>
+          <a:bodyPr rtlCol="0" anchor="ctr"/>
+          <a:lstStyle/>
+          <a:p>
+            <a:pPr algn="ctr"/>
+            <a:endParaRPr lang="en-US"/>
+          </a:p>
+        </p:txBody>
+      </p:sp>
+      <p:cxnSp>
+        <p:nvCxnSpPr>
+          <p:cNvPr id="10" name="Straight Arrow Connector 9"/>
+          <p:cNvCxnSpPr>
+            <a:stCxn id="8" idx="0"/>
+          </p:cNvCxnSpPr>
+          <p:nvPr/>
+        </p:nvCxnSpPr>
+        <p:spPr>
+          <a:xfrm flipV="1">
+            <a:off x="6331789" y="3623094"/>
+            <a:ext cx="577969" cy="2924355"/>
+          </a:xfrm>
+          <a:prstGeom prst="straightConnector1">
+            <a:avLst/>
+          </a:prstGeom>
+          <a:ln>
+            <a:tailEnd type="arrow"/>
+          </a:ln>
+        </p:spPr>
+        <p:style>
+          <a:lnRef idx="1">
+            <a:schemeClr val="accent1"/>
+          </a:lnRef>
+          <a:fillRef idx="0">
+            <a:schemeClr val="accent1"/>
+          </a:fillRef>
+          <a:effectRef idx="0">
+            <a:schemeClr val="accent1"/>
+          </a:effectRef>
+          <a:fontRef idx="minor">
+            <a:schemeClr val="tx1"/>
+          </a:fontRef>
+        </p:style>
+      </p:cxnSp>
+      <p:pic>
+        <p:nvPicPr>
+          <p:cNvPr id="4" name="Picture 3"/>
+          <p:cNvPicPr>
+            <a:picLocks noChangeAspect="1" noChangeArrowheads="1"/>
+          </p:cNvPicPr>
+          <p:nvPr/>
+        </p:nvPicPr>
+        <p:blipFill>
+          <a:blip r:embed="rId5" cstate="print"/>
+          <a:srcRect/>
+          <a:stretch>
+            <a:fillRect/>
+          </a:stretch>
+        </p:blipFill>
+        <p:spPr bwMode="auto">
+          <a:xfrm>
+            <a:off x="3602158" y="2135398"/>
+            <a:ext cx="975455" cy="1965579"/>
+          </a:xfrm>
+          <a:prstGeom prst="rect">
+            <a:avLst/>
+          </a:prstGeom>
+          <a:noFill/>
+          <a:ln w="9525">
+            <a:solidFill>
+              <a:schemeClr val="accent1"/>
+            </a:solidFill>
+            <a:miter lim="800000"/>
+            <a:headEnd/>
+            <a:tailEnd/>
+          </a:ln>
+        </p:spPr>
+      </p:pic>
+      <p:cxnSp>
+        <p:nvCxnSpPr>
+          <p:cNvPr id="13" name="Straight Arrow Connector 12"/>
+          <p:cNvCxnSpPr>
+            <a:endCxn id="4" idx="1"/>
+          </p:cNvCxnSpPr>
+          <p:nvPr/>
+        </p:nvCxnSpPr>
+        <p:spPr>
+          <a:xfrm flipV="1">
+            <a:off x="1475117" y="3118188"/>
+            <a:ext cx="2127041" cy="625676"/>
+          </a:xfrm>
+          <a:prstGeom prst="straightConnector1">
+            <a:avLst/>
+          </a:prstGeom>
+          <a:ln>
+            <a:tailEnd type="arrow"/>
+          </a:ln>
+        </p:spPr>
+        <p:style>
+          <a:lnRef idx="1">
+            <a:schemeClr val="accent1"/>
+          </a:lnRef>
+          <a:fillRef idx="0">
+            <a:schemeClr val="accent1"/>
+          </a:fillRef>
+          <a:effectRef idx="0">
+            <a:schemeClr val="accent1"/>
+          </a:effectRef>
+          <a:fontRef idx="minor">
+            <a:schemeClr val="tx1"/>
+          </a:fontRef>
+        </p:style>
+      </p:cxnSp>
+      <p:sp>
+        <p:nvSpPr>
+          <p:cNvPr id="14" name="TextBox 13"/>
+          <p:cNvSpPr txBox="1"/>
+          <p:nvPr/>
+        </p:nvSpPr>
+        <p:spPr>
+          <a:xfrm>
+            <a:off x="3683479" y="3726611"/>
+            <a:ext cx="879895" cy="369332"/>
+          </a:xfrm>
+          <a:prstGeom prst="rect">
+            <a:avLst/>
+          </a:prstGeom>
+          <a:gradFill flip="none" rotWithShape="1">
+            <a:gsLst>
+              <a:gs pos="0">
+                <a:schemeClr val="bg1">
+                  <a:alpha val="18000"/>
+                </a:schemeClr>
+              </a:gs>
+              <a:gs pos="50000">
+                <a:schemeClr val="bg1"/>
+              </a:gs>
+            </a:gsLst>
+            <a:lin ang="5400000" scaled="1"/>
+            <a:tileRect/>
+          </a:gradFill>
+        </p:spPr>
+        <p:txBody>
+          <a:bodyPr wrap="square" rtlCol="0">
+            <a:spAutoFit/>
+          </a:bodyPr>
+          <a:lstStyle/>
+          <a:p>
+            <a:pPr algn="ctr"/>
+            <a:r>
+              <a:rPr lang="en-US" dirty="0" smtClean="0"/>
+              <a:t>…</a:t>
+            </a:r>
+            <a:endParaRPr lang="en-US" dirty="0"/>
+          </a:p>
+        </p:txBody>
+      </p:sp>
     </p:spTree>
   </p:cSld>
   <p:clrMapOvr>
     <a:masterClrMapping/>
   </p:clrMapOvr>
+  <p:timing>
+    <p:tnLst>
+      <p:par>
+        <p:cTn id="1" dur="indefinite" restart="never" nodeType="tmRoot"/>
+      </p:par>
+    </p:tnLst>
+  </p:timing>
 </p:sld>
 </file>
 
@@ -8001,7 +8165,7 @@
           <a:p>
             <a:r>
               <a:rPr lang="en-US" dirty="0" smtClean="0"/>
-              <a:t>Router Application</a:t>
+              <a:t>Dynamic content</a:t>
             </a:r>
             <a:endParaRPr lang="en-US" dirty="0"/>
           </a:p>
@@ -8019,8 +8183,8 @@
         </p:nvSpPr>
         <p:spPr>
           <a:xfrm>
-            <a:off x="457201" y="2173856"/>
-            <a:ext cx="4321834" cy="4150743"/>
+            <a:off x="457200" y="1935480"/>
+            <a:ext cx="8350370" cy="4389120"/>
           </a:xfrm>
         </p:spPr>
         <p:txBody>
@@ -8030,40 +8194,161 @@
           <a:lstStyle/>
           <a:p>
             <a:r>
-              <a:rPr lang="en-US" sz="1600" dirty="0" smtClean="0"/>
-              <a:t>Creates a single-page applications with a Backbone route.</a:t>
-            </a:r>
-          </a:p>
-          <a:p>
-            <a:r>
-              <a:rPr lang="en-US" sz="1600" dirty="0" err="1" smtClean="0"/>
-              <a:t>nsdLoad</a:t>
-            </a:r>
-            <a:r>
-              <a:rPr lang="en-US" sz="1600" dirty="0" smtClean="0"/>
-              <a:t>() function – Ajax load with “Loading” indicator and error reporting. </a:t>
-            </a:r>
-          </a:p>
-          <a:p>
-            <a:r>
-              <a:rPr lang="en-US" sz="1600" dirty="0" smtClean="0"/>
-              <a:t>Lists of scripts and </a:t>
-            </a:r>
-            <a:r>
-              <a:rPr lang="en-US" sz="1600" dirty="0" err="1" smtClean="0"/>
-              <a:t>stylesheets</a:t>
-            </a:r>
-            <a:r>
-              <a:rPr lang="en-US" sz="1600" dirty="0" smtClean="0"/>
-              <a:t> are provided by the factory.</a:t>
-            </a:r>
-            <a:endParaRPr lang="en-US" sz="1600" dirty="0"/>
+              <a:rPr lang="en-US" sz="2000" dirty="0" smtClean="0"/>
+              <a:t>Content’s </a:t>
+            </a:r>
+            <a:r>
+              <a:rPr lang="en-US" sz="2000" dirty="0" err="1" smtClean="0">
+                <a:latin typeface="Courier New" pitchFamily="49" charset="0"/>
+                <a:cs typeface="Courier New" pitchFamily="49" charset="0"/>
+              </a:rPr>
+              <a:t>toString</a:t>
+            </a:r>
+            <a:r>
+              <a:rPr lang="en-US" sz="2000" dirty="0" smtClean="0">
+                <a:latin typeface="Courier New" pitchFamily="49" charset="0"/>
+                <a:cs typeface="Courier New" pitchFamily="49" charset="0"/>
+              </a:rPr>
+              <a:t>()</a:t>
+            </a:r>
+            <a:r>
+              <a:rPr lang="en-US" sz="2000" dirty="0" smtClean="0"/>
+              <a:t> is invoked every time component’s </a:t>
+            </a:r>
+            <a:r>
+              <a:rPr lang="en-US" sz="2000" dirty="0" err="1" smtClean="0">
+                <a:latin typeface="Courier New" pitchFamily="49" charset="0"/>
+                <a:cs typeface="Courier New" pitchFamily="49" charset="0"/>
+              </a:rPr>
+              <a:t>toString</a:t>
+            </a:r>
+            <a:r>
+              <a:rPr lang="en-US" sz="2000" dirty="0" smtClean="0">
+                <a:latin typeface="Courier New" pitchFamily="49" charset="0"/>
+                <a:cs typeface="Courier New" pitchFamily="49" charset="0"/>
+              </a:rPr>
+              <a:t>()</a:t>
+            </a:r>
+            <a:r>
+              <a:rPr lang="en-US" sz="2000" dirty="0" smtClean="0"/>
+              <a:t> is invoked.</a:t>
+            </a:r>
+          </a:p>
+          <a:p>
+            <a:r>
+              <a:rPr lang="en-US" sz="2000" dirty="0" smtClean="0"/>
+              <a:t>Therefore assembled components may be reused and will fetch fresh data every time their </a:t>
+            </a:r>
+            <a:r>
+              <a:rPr lang="en-US" sz="2000" dirty="0" err="1" smtClean="0">
+                <a:latin typeface="Courier New" pitchFamily="49" charset="0"/>
+                <a:cs typeface="Courier New" pitchFamily="49" charset="0"/>
+              </a:rPr>
+              <a:t>toString</a:t>
+            </a:r>
+            <a:r>
+              <a:rPr lang="en-US" sz="2000" dirty="0" smtClean="0">
+                <a:latin typeface="Courier New" pitchFamily="49" charset="0"/>
+                <a:cs typeface="Courier New" pitchFamily="49" charset="0"/>
+              </a:rPr>
+              <a:t>()</a:t>
+            </a:r>
+            <a:r>
+              <a:rPr lang="en-US" sz="2000" dirty="0" smtClean="0"/>
+              <a:t> is invoked.</a:t>
+            </a:r>
+          </a:p>
+          <a:p>
+            <a:r>
+              <a:rPr lang="en-US" sz="2000" dirty="0" err="1" smtClean="0">
+                <a:latin typeface="Courier New" pitchFamily="49" charset="0"/>
+                <a:cs typeface="Courier New" pitchFamily="49" charset="0"/>
+              </a:rPr>
+              <a:t>AutoCloseable</a:t>
+            </a:r>
+            <a:r>
+              <a:rPr lang="en-US" sz="2000" dirty="0" smtClean="0"/>
+              <a:t> content is closed when component is closed.</a:t>
+            </a:r>
+          </a:p>
+          <a:p>
+            <a:r>
+              <a:rPr lang="en-US" sz="2000" dirty="0" smtClean="0"/>
+              <a:t>Example: </a:t>
+            </a:r>
+          </a:p>
+          <a:p>
+            <a:pPr lvl="1"/>
+            <a:r>
+              <a:rPr lang="en-US" sz="1800" dirty="0" smtClean="0"/>
+              <a:t>Assemble user UI from preferences and metadata.</a:t>
+            </a:r>
+          </a:p>
+          <a:p>
+            <a:pPr lvl="1"/>
+            <a:r>
+              <a:rPr lang="en-US" sz="1800" dirty="0" smtClean="0"/>
+              <a:t>Wire dynamic content sources.</a:t>
+            </a:r>
+          </a:p>
+          <a:p>
+            <a:pPr lvl="1"/>
+            <a:r>
+              <a:rPr lang="en-US" sz="1800" dirty="0" smtClean="0"/>
+              <a:t>Store in user session.</a:t>
+            </a:r>
+          </a:p>
+          <a:p>
+            <a:pPr lvl="1"/>
+            <a:r>
+              <a:rPr lang="en-US" sz="1800" dirty="0" smtClean="0"/>
+              <a:t>Close UI top component when session closes.</a:t>
+            </a:r>
+          </a:p>
+          <a:p>
+            <a:pPr lvl="2"/>
+            <a:r>
+              <a:rPr lang="en-US" sz="1500" dirty="0" smtClean="0">
+                <a:latin typeface="Courier New" pitchFamily="49" charset="0"/>
+                <a:cs typeface="Courier New" pitchFamily="49" charset="0"/>
+              </a:rPr>
+              <a:t>close()</a:t>
+            </a:r>
+            <a:r>
+              <a:rPr lang="en-US" sz="1500" dirty="0" smtClean="0">
+                <a:cs typeface="Courier New" pitchFamily="49" charset="0"/>
+              </a:rPr>
+              <a:t> </a:t>
+            </a:r>
+            <a:r>
+              <a:rPr lang="en-US" sz="1500" dirty="0" smtClean="0"/>
+              <a:t>will traverse down to </a:t>
+            </a:r>
+            <a:r>
+              <a:rPr lang="en-US" sz="1500" dirty="0" err="1" smtClean="0">
+                <a:latin typeface="Courier New" pitchFamily="49" charset="0"/>
+                <a:cs typeface="Courier New" pitchFamily="49" charset="0"/>
+              </a:rPr>
+              <a:t>AutoCloseable</a:t>
+            </a:r>
+            <a:r>
+              <a:rPr lang="en-US" sz="1500" dirty="0" smtClean="0"/>
+              <a:t> </a:t>
+            </a:r>
+            <a:br>
+              <a:rPr lang="en-US" sz="1500" dirty="0" smtClean="0"/>
+            </a:br>
+            <a:r>
+              <a:rPr lang="en-US" sz="1500" dirty="0" smtClean="0"/>
+              <a:t>dynamic content and close it.</a:t>
+            </a:r>
+            <a:endParaRPr lang="en-US" sz="1500" dirty="0"/>
           </a:p>
         </p:txBody>
       </p:sp>
       <p:pic>
         <p:nvPicPr>
-          <p:cNvPr id="19458" name="Picture 2"/>
+          <p:cNvPr id="18437" name="Picture 5"/>
           <p:cNvPicPr>
             <a:picLocks noChangeAspect="1" noChangeArrowheads="1"/>
           </p:cNvPicPr>
@@ -8078,8 +8363,8 @@
         </p:blipFill>
         <p:spPr bwMode="auto">
           <a:xfrm>
-            <a:off x="497097" y="1880648"/>
-            <a:ext cx="6286500" cy="180975"/>
+            <a:off x="5804319" y="4471000"/>
+            <a:ext cx="2900363" cy="2085975"/>
           </a:xfrm>
           <a:prstGeom prst="rect">
             <a:avLst/>
@@ -8095,481 +8380,6 @@
           </a:ln>
         </p:spPr>
       </p:pic>
-      <p:pic>
-        <p:nvPicPr>
-          <p:cNvPr id="19459" name="Picture 3"/>
-          <p:cNvPicPr>
-            <a:picLocks noChangeAspect="1" noChangeArrowheads="1"/>
-          </p:cNvPicPr>
-          <p:nvPr/>
-        </p:nvPicPr>
-        <p:blipFill>
-          <a:blip r:embed="rId3" cstate="print"/>
-          <a:srcRect/>
-          <a:stretch>
-            <a:fillRect/>
-          </a:stretch>
-        </p:blipFill>
-        <p:spPr bwMode="auto">
-          <a:xfrm>
-            <a:off x="470140" y="4605620"/>
-            <a:ext cx="3771900" cy="1728788"/>
-          </a:xfrm>
-          <a:prstGeom prst="rect">
-            <a:avLst/>
-          </a:prstGeom>
-          <a:noFill/>
-          <a:ln w="9525">
-            <a:solidFill>
-              <a:schemeClr val="tx2"/>
-            </a:solidFill>
-            <a:miter lim="800000"/>
-            <a:headEnd/>
-            <a:tailEnd/>
-          </a:ln>
-        </p:spPr>
-      </p:pic>
-      <p:pic>
-        <p:nvPicPr>
-          <p:cNvPr id="19461" name="Picture 5"/>
-          <p:cNvPicPr>
-            <a:picLocks noChangeAspect="1" noChangeArrowheads="1"/>
-          </p:cNvPicPr>
-          <p:nvPr/>
-        </p:nvPicPr>
-        <p:blipFill>
-          <a:blip r:embed="rId4" cstate="print"/>
-          <a:srcRect/>
-          <a:stretch>
-            <a:fillRect/>
-          </a:stretch>
-        </p:blipFill>
-        <p:spPr bwMode="auto">
-          <a:xfrm>
-            <a:off x="4856672" y="2097767"/>
-            <a:ext cx="4106174" cy="4583391"/>
-          </a:xfrm>
-          <a:prstGeom prst="rect">
-            <a:avLst/>
-          </a:prstGeom>
-          <a:noFill/>
-          <a:ln w="9525">
-            <a:solidFill>
-              <a:schemeClr val="tx2"/>
-            </a:solidFill>
-            <a:miter lim="800000"/>
-            <a:headEnd/>
-            <a:tailEnd/>
-          </a:ln>
-        </p:spPr>
-      </p:pic>
-      <p:cxnSp>
-        <p:nvCxnSpPr>
-          <p:cNvPr id="9" name="Straight Arrow Connector 8"/>
-          <p:cNvCxnSpPr/>
-          <p:nvPr/>
-        </p:nvCxnSpPr>
-        <p:spPr>
-          <a:xfrm flipV="1">
-            <a:off x="4356340" y="2406770"/>
-            <a:ext cx="750498" cy="586596"/>
-          </a:xfrm>
-          <a:prstGeom prst="straightConnector1">
-            <a:avLst/>
-          </a:prstGeom>
-          <a:ln>
-            <a:tailEnd type="arrow"/>
-          </a:ln>
-        </p:spPr>
-        <p:style>
-          <a:lnRef idx="1">
-            <a:schemeClr val="accent1"/>
-          </a:lnRef>
-          <a:fillRef idx="0">
-            <a:schemeClr val="accent1"/>
-          </a:fillRef>
-          <a:effectRef idx="0">
-            <a:schemeClr val="accent1"/>
-          </a:effectRef>
-          <a:fontRef idx="minor">
-            <a:schemeClr val="tx1"/>
-          </a:fontRef>
-        </p:style>
-      </p:cxnSp>
-      <p:cxnSp>
-        <p:nvCxnSpPr>
-          <p:cNvPr id="11" name="Straight Connector 10"/>
-          <p:cNvCxnSpPr/>
-          <p:nvPr/>
-        </p:nvCxnSpPr>
-        <p:spPr>
-          <a:xfrm flipV="1">
-            <a:off x="1656272" y="2087593"/>
-            <a:ext cx="3191773" cy="3640347"/>
-          </a:xfrm>
-          <a:prstGeom prst="line">
-            <a:avLst/>
-          </a:prstGeom>
-        </p:spPr>
-        <p:style>
-          <a:lnRef idx="1">
-            <a:schemeClr val="accent4"/>
-          </a:lnRef>
-          <a:fillRef idx="0">
-            <a:schemeClr val="accent4"/>
-          </a:fillRef>
-          <a:effectRef idx="0">
-            <a:schemeClr val="accent4"/>
-          </a:effectRef>
-          <a:fontRef idx="minor">
-            <a:schemeClr val="tx1"/>
-          </a:fontRef>
-        </p:style>
-      </p:cxnSp>
-      <p:cxnSp>
-        <p:nvCxnSpPr>
-          <p:cNvPr id="12" name="Straight Connector 11"/>
-          <p:cNvCxnSpPr/>
-          <p:nvPr/>
-        </p:nvCxnSpPr>
-        <p:spPr>
-          <a:xfrm>
-            <a:off x="1647645" y="5736566"/>
-            <a:ext cx="3209027" cy="879894"/>
-          </a:xfrm>
-          <a:prstGeom prst="line">
-            <a:avLst/>
-          </a:prstGeom>
-        </p:spPr>
-        <p:style>
-          <a:lnRef idx="1">
-            <a:schemeClr val="accent4"/>
-          </a:lnRef>
-          <a:fillRef idx="0">
-            <a:schemeClr val="accent4"/>
-          </a:fillRef>
-          <a:effectRef idx="0">
-            <a:schemeClr val="accent4"/>
-          </a:effectRef>
-          <a:fontRef idx="minor">
-            <a:schemeClr val="tx1"/>
-          </a:fontRef>
-        </p:style>
-      </p:cxnSp>
-      <p:pic>
-        <p:nvPicPr>
-          <p:cNvPr id="19460" name="Picture 4"/>
-          <p:cNvPicPr>
-            <a:picLocks noChangeAspect="1" noChangeArrowheads="1"/>
-          </p:cNvPicPr>
-          <p:nvPr/>
-        </p:nvPicPr>
-        <p:blipFill>
-          <a:blip r:embed="rId5" cstate="print"/>
-          <a:srcRect/>
-          <a:stretch>
-            <a:fillRect/>
-          </a:stretch>
-        </p:blipFill>
-        <p:spPr bwMode="auto">
-          <a:xfrm>
-            <a:off x="2380081" y="3936519"/>
-            <a:ext cx="1864519" cy="571500"/>
-          </a:xfrm>
-          <a:prstGeom prst="rect">
-            <a:avLst/>
-          </a:prstGeom>
-          <a:noFill/>
-          <a:ln w="9525">
-            <a:solidFill>
-              <a:schemeClr val="tx2"/>
-            </a:solidFill>
-            <a:miter lim="800000"/>
-            <a:headEnd/>
-            <a:tailEnd/>
-          </a:ln>
-        </p:spPr>
-      </p:pic>
-      <p:cxnSp>
-        <p:nvCxnSpPr>
-          <p:cNvPr id="16" name="Straight Arrow Connector 15"/>
-          <p:cNvCxnSpPr/>
-          <p:nvPr/>
-        </p:nvCxnSpPr>
-        <p:spPr>
-          <a:xfrm>
-            <a:off x="1250830" y="3786996"/>
-            <a:ext cx="241540" cy="1276710"/>
-          </a:xfrm>
-          <a:prstGeom prst="straightConnector1">
-            <a:avLst/>
-          </a:prstGeom>
-          <a:ln>
-            <a:tailEnd type="arrow"/>
-          </a:ln>
-        </p:spPr>
-        <p:style>
-          <a:lnRef idx="1">
-            <a:schemeClr val="accent1"/>
-          </a:lnRef>
-          <a:fillRef idx="0">
-            <a:schemeClr val="accent1"/>
-          </a:fillRef>
-          <a:effectRef idx="0">
-            <a:schemeClr val="accent1"/>
-          </a:effectRef>
-          <a:fontRef idx="minor">
-            <a:schemeClr val="tx1"/>
-          </a:fontRef>
-        </p:style>
-      </p:cxnSp>
-      <p:cxnSp>
-        <p:nvCxnSpPr>
-          <p:cNvPr id="18" name="Straight Arrow Connector 17"/>
-          <p:cNvCxnSpPr/>
-          <p:nvPr/>
-        </p:nvCxnSpPr>
-        <p:spPr>
-          <a:xfrm flipH="1">
-            <a:off x="957532" y="3778370"/>
-            <a:ext cx="284673" cy="1518249"/>
-          </a:xfrm>
-          <a:prstGeom prst="straightConnector1">
-            <a:avLst/>
-          </a:prstGeom>
-          <a:ln>
-            <a:tailEnd type="arrow"/>
-          </a:ln>
-        </p:spPr>
-        <p:style>
-          <a:lnRef idx="1">
-            <a:schemeClr val="accent1"/>
-          </a:lnRef>
-          <a:fillRef idx="0">
-            <a:schemeClr val="accent1"/>
-          </a:fillRef>
-          <a:effectRef idx="0">
-            <a:schemeClr val="accent1"/>
-          </a:effectRef>
-          <a:fontRef idx="minor">
-            <a:schemeClr val="tx1"/>
-          </a:fontRef>
-        </p:style>
-      </p:cxnSp>
-      <p:cxnSp>
-        <p:nvCxnSpPr>
-          <p:cNvPr id="20" name="Straight Arrow Connector 19"/>
-          <p:cNvCxnSpPr/>
-          <p:nvPr/>
-        </p:nvCxnSpPr>
-        <p:spPr>
-          <a:xfrm>
-            <a:off x="2286000" y="2613804"/>
-            <a:ext cx="3209026" cy="2303253"/>
-          </a:xfrm>
-          <a:prstGeom prst="straightConnector1">
-            <a:avLst/>
-          </a:prstGeom>
-          <a:ln>
-            <a:tailEnd type="arrow"/>
-          </a:ln>
-        </p:spPr>
-        <p:style>
-          <a:lnRef idx="1">
-            <a:schemeClr val="accent1"/>
-          </a:lnRef>
-          <a:fillRef idx="0">
-            <a:schemeClr val="accent1"/>
-          </a:fillRef>
-          <a:effectRef idx="0">
-            <a:schemeClr val="accent1"/>
-          </a:effectRef>
-          <a:fontRef idx="minor">
-            <a:schemeClr val="tx1"/>
-          </a:fontRef>
-        </p:style>
-      </p:cxnSp>
-      <p:cxnSp>
-        <p:nvCxnSpPr>
-          <p:cNvPr id="22" name="Straight Arrow Connector 21"/>
-          <p:cNvCxnSpPr/>
-          <p:nvPr/>
-        </p:nvCxnSpPr>
-        <p:spPr>
-          <a:xfrm>
-            <a:off x="3450566" y="4235570"/>
-            <a:ext cx="2242868" cy="1984075"/>
-          </a:xfrm>
-          <a:prstGeom prst="straightConnector1">
-            <a:avLst/>
-          </a:prstGeom>
-          <a:ln>
-            <a:tailEnd type="arrow"/>
-          </a:ln>
-        </p:spPr>
-        <p:style>
-          <a:lnRef idx="1">
-            <a:schemeClr val="accent1"/>
-          </a:lnRef>
-          <a:fillRef idx="0">
-            <a:schemeClr val="accent1"/>
-          </a:fillRef>
-          <a:effectRef idx="0">
-            <a:schemeClr val="accent1"/>
-          </a:effectRef>
-          <a:fontRef idx="minor">
-            <a:schemeClr val="tx1"/>
-          </a:fontRef>
-        </p:style>
-      </p:cxnSp>
-      <p:cxnSp>
-        <p:nvCxnSpPr>
-          <p:cNvPr id="24" name="Straight Arrow Connector 23"/>
-          <p:cNvCxnSpPr/>
-          <p:nvPr/>
-        </p:nvCxnSpPr>
-        <p:spPr>
-          <a:xfrm flipH="1">
-            <a:off x="1337094" y="4459857"/>
-            <a:ext cx="2242869" cy="1570007"/>
-          </a:xfrm>
-          <a:prstGeom prst="straightConnector1">
-            <a:avLst/>
-          </a:prstGeom>
-          <a:ln>
-            <a:tailEnd type="arrow"/>
-          </a:ln>
-        </p:spPr>
-        <p:style>
-          <a:lnRef idx="1">
-            <a:schemeClr val="accent1"/>
-          </a:lnRef>
-          <a:fillRef idx="0">
-            <a:schemeClr val="accent1"/>
-          </a:fillRef>
-          <a:effectRef idx="0">
-            <a:schemeClr val="accent1"/>
-          </a:effectRef>
-          <a:fontRef idx="minor">
-            <a:schemeClr val="tx1"/>
-          </a:fontRef>
-        </p:style>
-      </p:cxnSp>
-      <p:sp>
-        <p:nvSpPr>
-          <p:cNvPr id="27" name="Line Callout 1 (No Border) 26"/>
-          <p:cNvSpPr/>
-          <p:nvPr/>
-        </p:nvSpPr>
-        <p:spPr>
-          <a:xfrm>
-            <a:off x="2234242" y="6409426"/>
-            <a:ext cx="2467155" cy="336430"/>
-          </a:xfrm>
-          <a:prstGeom prst="callout1">
-            <a:avLst>
-              <a:gd name="adj1" fmla="val 52083"/>
-              <a:gd name="adj2" fmla="val -291"/>
-              <a:gd name="adj3" fmla="val -90064"/>
-              <a:gd name="adj4" fmla="val -20851"/>
-            </a:avLst>
-          </a:prstGeom>
-        </p:spPr>
-        <p:style>
-          <a:lnRef idx="2">
-            <a:schemeClr val="accent1">
-              <a:shade val="50000"/>
-            </a:schemeClr>
-          </a:lnRef>
-          <a:fillRef idx="1">
-            <a:schemeClr val="accent1"/>
-          </a:fillRef>
-          <a:effectRef idx="0">
-            <a:schemeClr val="accent1"/>
-          </a:effectRef>
-          <a:fontRef idx="minor">
-            <a:schemeClr val="lt1"/>
-          </a:fontRef>
-        </p:style>
-        <p:txBody>
-          <a:bodyPr rtlCol="0" anchor="ctr"/>
-          <a:lstStyle/>
-          <a:p>
-            <a:pPr algn="ctr"/>
-            <a:r>
-              <a:rPr lang="en-US" sz="1000" dirty="0" smtClean="0"/>
-              <a:t>Ajax loaded from test.html (initial route)</a:t>
-            </a:r>
-            <a:endParaRPr lang="en-US" sz="1000" dirty="0"/>
-          </a:p>
-        </p:txBody>
-      </p:sp>
-      <p:cxnSp>
-        <p:nvCxnSpPr>
-          <p:cNvPr id="34" name="Straight Arrow Connector 33"/>
-          <p:cNvCxnSpPr/>
-          <p:nvPr/>
-        </p:nvCxnSpPr>
-        <p:spPr>
-          <a:xfrm flipH="1">
-            <a:off x="1708030" y="4114800"/>
-            <a:ext cx="923027" cy="828136"/>
-          </a:xfrm>
-          <a:prstGeom prst="straightConnector1">
-            <a:avLst/>
-          </a:prstGeom>
-          <a:ln>
-            <a:tailEnd type="arrow"/>
-          </a:ln>
-        </p:spPr>
-        <p:style>
-          <a:lnRef idx="1">
-            <a:schemeClr val="accent1"/>
-          </a:lnRef>
-          <a:fillRef idx="0">
-            <a:schemeClr val="accent1"/>
-          </a:fillRef>
-          <a:effectRef idx="0">
-            <a:schemeClr val="accent1"/>
-          </a:effectRef>
-          <a:fontRef idx="minor">
-            <a:schemeClr val="tx1"/>
-          </a:fontRef>
-        </p:style>
-      </p:cxnSp>
-      <p:cxnSp>
-        <p:nvCxnSpPr>
-          <p:cNvPr id="36" name="Straight Arrow Connector 35"/>
-          <p:cNvCxnSpPr/>
-          <p:nvPr/>
-        </p:nvCxnSpPr>
-        <p:spPr>
-          <a:xfrm flipH="1" flipV="1">
-            <a:off x="2536166" y="6072996"/>
-            <a:ext cx="3148642" cy="189781"/>
-          </a:xfrm>
-          <a:prstGeom prst="straightConnector1">
-            <a:avLst/>
-          </a:prstGeom>
-          <a:ln>
-            <a:tailEnd type="arrow"/>
-          </a:ln>
-        </p:spPr>
-        <p:style>
-          <a:lnRef idx="1">
-            <a:schemeClr val="accent1"/>
-          </a:lnRef>
-          <a:fillRef idx="0">
-            <a:schemeClr val="accent1"/>
-          </a:fillRef>
-          <a:effectRef idx="0">
-            <a:schemeClr val="accent1"/>
-          </a:effectRef>
-          <a:fontRef idx="minor">
-            <a:schemeClr val="tx1"/>
-          </a:fontRef>
-        </p:style>
-      </p:cxnSp>
     </p:spTree>
   </p:cSld>
   <p:clrMapOvr>
@@ -8612,15 +8422,69 @@
           <a:p>
             <a:r>
               <a:rPr lang="en-US" dirty="0" smtClean="0"/>
-              <a:t>Sample application</a:t>
+              <a:t>Router Application</a:t>
             </a:r>
             <a:endParaRPr lang="en-US" dirty="0"/>
+          </a:p>
+        </p:txBody>
+      </p:sp>
+      <p:sp>
+        <p:nvSpPr>
+          <p:cNvPr id="3" name="Content Placeholder 2"/>
+          <p:cNvSpPr>
+            <a:spLocks noGrp="1"/>
+          </p:cNvSpPr>
+          <p:nvPr>
+            <p:ph idx="1"/>
+          </p:nvPr>
+        </p:nvSpPr>
+        <p:spPr>
+          <a:xfrm>
+            <a:off x="457201" y="2173856"/>
+            <a:ext cx="4321834" cy="4150743"/>
+          </a:xfrm>
+        </p:spPr>
+        <p:txBody>
+          <a:bodyPr>
+            <a:normAutofit/>
+          </a:bodyPr>
+          <a:lstStyle/>
+          <a:p>
+            <a:r>
+              <a:rPr lang="en-US" sz="1600" dirty="0" smtClean="0"/>
+              <a:t>Creates a single-page applications with a Backbone route.</a:t>
+            </a:r>
+          </a:p>
+          <a:p>
+            <a:r>
+              <a:rPr lang="en-US" sz="1600" dirty="0" err="1" smtClean="0"/>
+              <a:t>nsdLoad</a:t>
+            </a:r>
+            <a:r>
+              <a:rPr lang="en-US" sz="1600" dirty="0" smtClean="0"/>
+              <a:t>() function – Ajax load with “Loading” indicator and error reporting. </a:t>
+            </a:r>
+          </a:p>
+          <a:p>
+            <a:r>
+              <a:rPr lang="en-US" sz="1600" dirty="0" smtClean="0"/>
+              <a:t>Lists of scripts and </a:t>
+            </a:r>
+            <a:r>
+              <a:rPr lang="en-US" sz="1600" dirty="0" err="1" smtClean="0"/>
+              <a:t>stylesheets</a:t>
+            </a:r>
+            <a:r>
+              <a:rPr lang="en-US" sz="1600" dirty="0" smtClean="0"/>
+              <a:t> are provided by the factory.</a:t>
+            </a:r>
+            <a:endParaRPr lang="en-US" sz="1600" dirty="0"/>
           </a:p>
         </p:txBody>
       </p:sp>
       <p:pic>
         <p:nvPicPr>
-          <p:cNvPr id="1028" name="Picture 4"/>
+          <p:cNvPr id="19458" name="Picture 2"/>
           <p:cNvPicPr>
             <a:picLocks noChangeAspect="1" noChangeArrowheads="1"/>
           </p:cNvPicPr>
@@ -8635,15 +8499,17 @@
         </p:blipFill>
         <p:spPr bwMode="auto">
           <a:xfrm>
-            <a:off x="218683" y="1828800"/>
-            <a:ext cx="4224703" cy="3614468"/>
+            <a:off x="497097" y="1880648"/>
+            <a:ext cx="6286500" cy="180975"/>
           </a:xfrm>
           <a:prstGeom prst="rect">
             <a:avLst/>
           </a:prstGeom>
           <a:noFill/>
           <a:ln w="9525">
-            <a:noFill/>
+            <a:solidFill>
+              <a:schemeClr val="tx2"/>
+            </a:solidFill>
             <a:miter lim="800000"/>
             <a:headEnd/>
             <a:tailEnd/>
@@ -8652,7 +8518,7 @@
       </p:pic>
       <p:pic>
         <p:nvPicPr>
-          <p:cNvPr id="1029" name="Picture 5"/>
+          <p:cNvPr id="19459" name="Picture 3"/>
           <p:cNvPicPr>
             <a:picLocks noChangeAspect="1" noChangeArrowheads="1"/>
           </p:cNvPicPr>
@@ -8667,8 +8533,8 @@
         </p:blipFill>
         <p:spPr bwMode="auto">
           <a:xfrm>
-            <a:off x="4470614" y="1863304"/>
-            <a:ext cx="4529563" cy="4330461"/>
+            <a:off x="470140" y="4605620"/>
+            <a:ext cx="3771900" cy="1728788"/>
           </a:xfrm>
           <a:prstGeom prst="rect">
             <a:avLst/>
@@ -8676,7 +8542,7 @@
           <a:noFill/>
           <a:ln w="9525">
             <a:solidFill>
-              <a:schemeClr val="accent1"/>
+              <a:schemeClr val="tx2"/>
             </a:solidFill>
             <a:miter lim="800000"/>
             <a:headEnd/>
@@ -8684,6 +8550,447 @@
           </a:ln>
         </p:spPr>
       </p:pic>
+      <p:pic>
+        <p:nvPicPr>
+          <p:cNvPr id="19461" name="Picture 5"/>
+          <p:cNvPicPr>
+            <a:picLocks noChangeAspect="1" noChangeArrowheads="1"/>
+          </p:cNvPicPr>
+          <p:nvPr/>
+        </p:nvPicPr>
+        <p:blipFill>
+          <a:blip r:embed="rId4" cstate="print"/>
+          <a:srcRect/>
+          <a:stretch>
+            <a:fillRect/>
+          </a:stretch>
+        </p:blipFill>
+        <p:spPr bwMode="auto">
+          <a:xfrm>
+            <a:off x="4856672" y="2097767"/>
+            <a:ext cx="4106174" cy="4583391"/>
+          </a:xfrm>
+          <a:prstGeom prst="rect">
+            <a:avLst/>
+          </a:prstGeom>
+          <a:noFill/>
+          <a:ln w="9525">
+            <a:solidFill>
+              <a:schemeClr val="tx2"/>
+            </a:solidFill>
+            <a:miter lim="800000"/>
+            <a:headEnd/>
+            <a:tailEnd/>
+          </a:ln>
+        </p:spPr>
+      </p:pic>
+      <p:cxnSp>
+        <p:nvCxnSpPr>
+          <p:cNvPr id="9" name="Straight Arrow Connector 8"/>
+          <p:cNvCxnSpPr/>
+          <p:nvPr/>
+        </p:nvCxnSpPr>
+        <p:spPr>
+          <a:xfrm flipV="1">
+            <a:off x="4356340" y="2406770"/>
+            <a:ext cx="750498" cy="586596"/>
+          </a:xfrm>
+          <a:prstGeom prst="straightConnector1">
+            <a:avLst/>
+          </a:prstGeom>
+          <a:ln>
+            <a:tailEnd type="arrow"/>
+          </a:ln>
+        </p:spPr>
+        <p:style>
+          <a:lnRef idx="1">
+            <a:schemeClr val="accent1"/>
+          </a:lnRef>
+          <a:fillRef idx="0">
+            <a:schemeClr val="accent1"/>
+          </a:fillRef>
+          <a:effectRef idx="0">
+            <a:schemeClr val="accent1"/>
+          </a:effectRef>
+          <a:fontRef idx="minor">
+            <a:schemeClr val="tx1"/>
+          </a:fontRef>
+        </p:style>
+      </p:cxnSp>
+      <p:cxnSp>
+        <p:nvCxnSpPr>
+          <p:cNvPr id="11" name="Straight Connector 10"/>
+          <p:cNvCxnSpPr/>
+          <p:nvPr/>
+        </p:nvCxnSpPr>
+        <p:spPr>
+          <a:xfrm flipV="1">
+            <a:off x="1656272" y="2087593"/>
+            <a:ext cx="3191773" cy="3640347"/>
+          </a:xfrm>
+          <a:prstGeom prst="line">
+            <a:avLst/>
+          </a:prstGeom>
+        </p:spPr>
+        <p:style>
+          <a:lnRef idx="1">
+            <a:schemeClr val="accent4"/>
+          </a:lnRef>
+          <a:fillRef idx="0">
+            <a:schemeClr val="accent4"/>
+          </a:fillRef>
+          <a:effectRef idx="0">
+            <a:schemeClr val="accent4"/>
+          </a:effectRef>
+          <a:fontRef idx="minor">
+            <a:schemeClr val="tx1"/>
+          </a:fontRef>
+        </p:style>
+      </p:cxnSp>
+      <p:cxnSp>
+        <p:nvCxnSpPr>
+          <p:cNvPr id="12" name="Straight Connector 11"/>
+          <p:cNvCxnSpPr/>
+          <p:nvPr/>
+        </p:nvCxnSpPr>
+        <p:spPr>
+          <a:xfrm>
+            <a:off x="1647645" y="5736566"/>
+            <a:ext cx="3209027" cy="879894"/>
+          </a:xfrm>
+          <a:prstGeom prst="line">
+            <a:avLst/>
+          </a:prstGeom>
+        </p:spPr>
+        <p:style>
+          <a:lnRef idx="1">
+            <a:schemeClr val="accent4"/>
+          </a:lnRef>
+          <a:fillRef idx="0">
+            <a:schemeClr val="accent4"/>
+          </a:fillRef>
+          <a:effectRef idx="0">
+            <a:schemeClr val="accent4"/>
+          </a:effectRef>
+          <a:fontRef idx="minor">
+            <a:schemeClr val="tx1"/>
+          </a:fontRef>
+        </p:style>
+      </p:cxnSp>
+      <p:pic>
+        <p:nvPicPr>
+          <p:cNvPr id="19460" name="Picture 4"/>
+          <p:cNvPicPr>
+            <a:picLocks noChangeAspect="1" noChangeArrowheads="1"/>
+          </p:cNvPicPr>
+          <p:nvPr/>
+        </p:nvPicPr>
+        <p:blipFill>
+          <a:blip r:embed="rId5" cstate="print"/>
+          <a:srcRect/>
+          <a:stretch>
+            <a:fillRect/>
+          </a:stretch>
+        </p:blipFill>
+        <p:spPr bwMode="auto">
+          <a:xfrm>
+            <a:off x="2380081" y="3936519"/>
+            <a:ext cx="1864519" cy="571500"/>
+          </a:xfrm>
+          <a:prstGeom prst="rect">
+            <a:avLst/>
+          </a:prstGeom>
+          <a:noFill/>
+          <a:ln w="9525">
+            <a:solidFill>
+              <a:schemeClr val="tx2"/>
+            </a:solidFill>
+            <a:miter lim="800000"/>
+            <a:headEnd/>
+            <a:tailEnd/>
+          </a:ln>
+        </p:spPr>
+      </p:pic>
+      <p:cxnSp>
+        <p:nvCxnSpPr>
+          <p:cNvPr id="16" name="Straight Arrow Connector 15"/>
+          <p:cNvCxnSpPr/>
+          <p:nvPr/>
+        </p:nvCxnSpPr>
+        <p:spPr>
+          <a:xfrm>
+            <a:off x="1250830" y="3786996"/>
+            <a:ext cx="241540" cy="1276710"/>
+          </a:xfrm>
+          <a:prstGeom prst="straightConnector1">
+            <a:avLst/>
+          </a:prstGeom>
+          <a:ln>
+            <a:tailEnd type="arrow"/>
+          </a:ln>
+        </p:spPr>
+        <p:style>
+          <a:lnRef idx="1">
+            <a:schemeClr val="accent1"/>
+          </a:lnRef>
+          <a:fillRef idx="0">
+            <a:schemeClr val="accent1"/>
+          </a:fillRef>
+          <a:effectRef idx="0">
+            <a:schemeClr val="accent1"/>
+          </a:effectRef>
+          <a:fontRef idx="minor">
+            <a:schemeClr val="tx1"/>
+          </a:fontRef>
+        </p:style>
+      </p:cxnSp>
+      <p:cxnSp>
+        <p:nvCxnSpPr>
+          <p:cNvPr id="18" name="Straight Arrow Connector 17"/>
+          <p:cNvCxnSpPr/>
+          <p:nvPr/>
+        </p:nvCxnSpPr>
+        <p:spPr>
+          <a:xfrm flipH="1">
+            <a:off x="957532" y="3778370"/>
+            <a:ext cx="284673" cy="1518249"/>
+          </a:xfrm>
+          <a:prstGeom prst="straightConnector1">
+            <a:avLst/>
+          </a:prstGeom>
+          <a:ln>
+            <a:tailEnd type="arrow"/>
+          </a:ln>
+        </p:spPr>
+        <p:style>
+          <a:lnRef idx="1">
+            <a:schemeClr val="accent1"/>
+          </a:lnRef>
+          <a:fillRef idx="0">
+            <a:schemeClr val="accent1"/>
+          </a:fillRef>
+          <a:effectRef idx="0">
+            <a:schemeClr val="accent1"/>
+          </a:effectRef>
+          <a:fontRef idx="minor">
+            <a:schemeClr val="tx1"/>
+          </a:fontRef>
+        </p:style>
+      </p:cxnSp>
+      <p:cxnSp>
+        <p:nvCxnSpPr>
+          <p:cNvPr id="20" name="Straight Arrow Connector 19"/>
+          <p:cNvCxnSpPr/>
+          <p:nvPr/>
+        </p:nvCxnSpPr>
+        <p:spPr>
+          <a:xfrm>
+            <a:off x="2286000" y="2613804"/>
+            <a:ext cx="3209026" cy="2303253"/>
+          </a:xfrm>
+          <a:prstGeom prst="straightConnector1">
+            <a:avLst/>
+          </a:prstGeom>
+          <a:ln>
+            <a:tailEnd type="arrow"/>
+          </a:ln>
+        </p:spPr>
+        <p:style>
+          <a:lnRef idx="1">
+            <a:schemeClr val="accent1"/>
+          </a:lnRef>
+          <a:fillRef idx="0">
+            <a:schemeClr val="accent1"/>
+          </a:fillRef>
+          <a:effectRef idx="0">
+            <a:schemeClr val="accent1"/>
+          </a:effectRef>
+          <a:fontRef idx="minor">
+            <a:schemeClr val="tx1"/>
+          </a:fontRef>
+        </p:style>
+      </p:cxnSp>
+      <p:cxnSp>
+        <p:nvCxnSpPr>
+          <p:cNvPr id="22" name="Straight Arrow Connector 21"/>
+          <p:cNvCxnSpPr/>
+          <p:nvPr/>
+        </p:nvCxnSpPr>
+        <p:spPr>
+          <a:xfrm>
+            <a:off x="3450566" y="4235570"/>
+            <a:ext cx="2242868" cy="1984075"/>
+          </a:xfrm>
+          <a:prstGeom prst="straightConnector1">
+            <a:avLst/>
+          </a:prstGeom>
+          <a:ln>
+            <a:tailEnd type="arrow"/>
+          </a:ln>
+        </p:spPr>
+        <p:style>
+          <a:lnRef idx="1">
+            <a:schemeClr val="accent1"/>
+          </a:lnRef>
+          <a:fillRef idx="0">
+            <a:schemeClr val="accent1"/>
+          </a:fillRef>
+          <a:effectRef idx="0">
+            <a:schemeClr val="accent1"/>
+          </a:effectRef>
+          <a:fontRef idx="minor">
+            <a:schemeClr val="tx1"/>
+          </a:fontRef>
+        </p:style>
+      </p:cxnSp>
+      <p:cxnSp>
+        <p:nvCxnSpPr>
+          <p:cNvPr id="24" name="Straight Arrow Connector 23"/>
+          <p:cNvCxnSpPr/>
+          <p:nvPr/>
+        </p:nvCxnSpPr>
+        <p:spPr>
+          <a:xfrm flipH="1">
+            <a:off x="1337094" y="4459857"/>
+            <a:ext cx="2242869" cy="1570007"/>
+          </a:xfrm>
+          <a:prstGeom prst="straightConnector1">
+            <a:avLst/>
+          </a:prstGeom>
+          <a:ln>
+            <a:tailEnd type="arrow"/>
+          </a:ln>
+        </p:spPr>
+        <p:style>
+          <a:lnRef idx="1">
+            <a:schemeClr val="accent1"/>
+          </a:lnRef>
+          <a:fillRef idx="0">
+            <a:schemeClr val="accent1"/>
+          </a:fillRef>
+          <a:effectRef idx="0">
+            <a:schemeClr val="accent1"/>
+          </a:effectRef>
+          <a:fontRef idx="minor">
+            <a:schemeClr val="tx1"/>
+          </a:fontRef>
+        </p:style>
+      </p:cxnSp>
+      <p:sp>
+        <p:nvSpPr>
+          <p:cNvPr id="27" name="Line Callout 1 (No Border) 26"/>
+          <p:cNvSpPr/>
+          <p:nvPr/>
+        </p:nvSpPr>
+        <p:spPr>
+          <a:xfrm>
+            <a:off x="2234242" y="6409426"/>
+            <a:ext cx="2467155" cy="336430"/>
+          </a:xfrm>
+          <a:prstGeom prst="callout1">
+            <a:avLst>
+              <a:gd name="adj1" fmla="val 52083"/>
+              <a:gd name="adj2" fmla="val -291"/>
+              <a:gd name="adj3" fmla="val -90064"/>
+              <a:gd name="adj4" fmla="val -20851"/>
+            </a:avLst>
+          </a:prstGeom>
+        </p:spPr>
+        <p:style>
+          <a:lnRef idx="2">
+            <a:schemeClr val="accent1">
+              <a:shade val="50000"/>
+            </a:schemeClr>
+          </a:lnRef>
+          <a:fillRef idx="1">
+            <a:schemeClr val="accent1"/>
+          </a:fillRef>
+          <a:effectRef idx="0">
+            <a:schemeClr val="accent1"/>
+          </a:effectRef>
+          <a:fontRef idx="minor">
+            <a:schemeClr val="lt1"/>
+          </a:fontRef>
+        </p:style>
+        <p:txBody>
+          <a:bodyPr rtlCol="0" anchor="ctr"/>
+          <a:lstStyle/>
+          <a:p>
+            <a:pPr algn="ctr"/>
+            <a:r>
+              <a:rPr lang="en-US" sz="1000" dirty="0" smtClean="0"/>
+              <a:t>Ajax loaded from test.html (initial route)</a:t>
+            </a:r>
+            <a:endParaRPr lang="en-US" sz="1000" dirty="0"/>
+          </a:p>
+        </p:txBody>
+      </p:sp>
+      <p:cxnSp>
+        <p:nvCxnSpPr>
+          <p:cNvPr id="34" name="Straight Arrow Connector 33"/>
+          <p:cNvCxnSpPr/>
+          <p:nvPr/>
+        </p:nvCxnSpPr>
+        <p:spPr>
+          <a:xfrm flipH="1">
+            <a:off x="1708030" y="4114800"/>
+            <a:ext cx="923027" cy="828136"/>
+          </a:xfrm>
+          <a:prstGeom prst="straightConnector1">
+            <a:avLst/>
+          </a:prstGeom>
+          <a:ln>
+            <a:tailEnd type="arrow"/>
+          </a:ln>
+        </p:spPr>
+        <p:style>
+          <a:lnRef idx="1">
+            <a:schemeClr val="accent1"/>
+          </a:lnRef>
+          <a:fillRef idx="0">
+            <a:schemeClr val="accent1"/>
+          </a:fillRef>
+          <a:effectRef idx="0">
+            <a:schemeClr val="accent1"/>
+          </a:effectRef>
+          <a:fontRef idx="minor">
+            <a:schemeClr val="tx1"/>
+          </a:fontRef>
+        </p:style>
+      </p:cxnSp>
+      <p:cxnSp>
+        <p:nvCxnSpPr>
+          <p:cNvPr id="36" name="Straight Arrow Connector 35"/>
+          <p:cNvCxnSpPr/>
+          <p:nvPr/>
+        </p:nvCxnSpPr>
+        <p:spPr>
+          <a:xfrm flipH="1" flipV="1">
+            <a:off x="2536166" y="6072996"/>
+            <a:ext cx="3148642" cy="189781"/>
+          </a:xfrm>
+          <a:prstGeom prst="straightConnector1">
+            <a:avLst/>
+          </a:prstGeom>
+          <a:ln>
+            <a:tailEnd type="arrow"/>
+          </a:ln>
+        </p:spPr>
+        <p:style>
+          <a:lnRef idx="1">
+            <a:schemeClr val="accent1"/>
+          </a:lnRef>
+          <a:fillRef idx="0">
+            <a:schemeClr val="accent1"/>
+          </a:fillRef>
+          <a:effectRef idx="0">
+            <a:schemeClr val="accent1"/>
+          </a:effectRef>
+          <a:fontRef idx="minor">
+            <a:schemeClr val="tx1"/>
+          </a:fontRef>
+        </p:style>
+      </p:cxnSp>
     </p:spTree>
   </p:cSld>
   <p:clrMapOvr>
@@ -8726,49 +9033,15 @@
           <a:p>
             <a:r>
               <a:rPr lang="en-US" dirty="0" smtClean="0"/>
-              <a:t>Account summary page</a:t>
+              <a:t>Sample application</a:t>
             </a:r>
             <a:endParaRPr lang="en-US" dirty="0"/>
-          </a:p>
-        </p:txBody>
-      </p:sp>
-      <p:sp>
-        <p:nvSpPr>
-          <p:cNvPr id="6" name="TextBox 5"/>
-          <p:cNvSpPr txBox="1"/>
-          <p:nvPr/>
-        </p:nvSpPr>
-        <p:spPr>
-          <a:xfrm>
-            <a:off x="3830128" y="802256"/>
-            <a:ext cx="4627998" cy="276999"/>
-          </a:xfrm>
-          <a:prstGeom prst="rect">
-            <a:avLst/>
-          </a:prstGeom>
-          <a:noFill/>
-        </p:spPr>
-        <p:txBody>
-          <a:bodyPr wrap="none" rtlCol="0">
-            <a:spAutoFit/>
-          </a:bodyPr>
-          <a:lstStyle/>
-          <a:p>
-            <a:r>
-              <a:rPr lang="en-US" sz="1200" dirty="0" smtClean="0">
-                <a:latin typeface="+mj-lt"/>
-              </a:rPr>
-              <a:t>Transactions table is dynamically reloaded on transaction period select </a:t>
-            </a:r>
-            <a:endParaRPr lang="en-US" sz="1200" dirty="0">
-              <a:latin typeface="+mj-lt"/>
-            </a:endParaRPr>
           </a:p>
         </p:txBody>
       </p:sp>
       <p:pic>
         <p:nvPicPr>
-          <p:cNvPr id="2054" name="Picture 6"/>
+          <p:cNvPr id="1028" name="Picture 4"/>
           <p:cNvPicPr>
             <a:picLocks noChangeAspect="1" noChangeArrowheads="1"/>
           </p:cNvPicPr>
@@ -8783,8 +9056,8 @@
         </p:blipFill>
         <p:spPr bwMode="auto">
           <a:xfrm>
-            <a:off x="414054" y="1871929"/>
-            <a:ext cx="4444843" cy="4373594"/>
+            <a:off x="218683" y="1828800"/>
+            <a:ext cx="4224703" cy="3614468"/>
           </a:xfrm>
           <a:prstGeom prst="rect">
             <a:avLst/>
@@ -8800,7 +9073,7 @@
       </p:pic>
       <p:pic>
         <p:nvPicPr>
-          <p:cNvPr id="2055" name="Picture 7"/>
+          <p:cNvPr id="1029" name="Picture 5"/>
           <p:cNvPicPr>
             <a:picLocks noChangeAspect="1" noChangeArrowheads="1"/>
           </p:cNvPicPr>
@@ -8815,8 +9088,8 @@
         </p:blipFill>
         <p:spPr bwMode="auto">
           <a:xfrm>
-            <a:off x="4905440" y="1889184"/>
-            <a:ext cx="4074658" cy="4519628"/>
+            <a:off x="4470614" y="1863304"/>
+            <a:ext cx="4529563" cy="4330461"/>
           </a:xfrm>
           <a:prstGeom prst="rect">
             <a:avLst/>
@@ -8874,15 +9147,49 @@
           <a:p>
             <a:r>
               <a:rPr lang="en-US" dirty="0" smtClean="0"/>
-              <a:t>Transactions table generation</a:t>
+              <a:t>Account summary page</a:t>
             </a:r>
             <a:endParaRPr lang="en-US" dirty="0"/>
+          </a:p>
+        </p:txBody>
+      </p:sp>
+      <p:sp>
+        <p:nvSpPr>
+          <p:cNvPr id="6" name="TextBox 5"/>
+          <p:cNvSpPr txBox="1"/>
+          <p:nvPr/>
+        </p:nvSpPr>
+        <p:spPr>
+          <a:xfrm>
+            <a:off x="3830128" y="802256"/>
+            <a:ext cx="4627998" cy="276999"/>
+          </a:xfrm>
+          <a:prstGeom prst="rect">
+            <a:avLst/>
+          </a:prstGeom>
+          <a:noFill/>
+        </p:spPr>
+        <p:txBody>
+          <a:bodyPr wrap="none" rtlCol="0">
+            <a:spAutoFit/>
+          </a:bodyPr>
+          <a:lstStyle/>
+          <a:p>
+            <a:r>
+              <a:rPr lang="en-US" sz="1200" dirty="0" smtClean="0">
+                <a:latin typeface="+mj-lt"/>
+              </a:rPr>
+              <a:t>Transactions table is dynamically reloaded on transaction period select </a:t>
+            </a:r>
+            <a:endParaRPr lang="en-US" sz="1200" dirty="0">
+              <a:latin typeface="+mj-lt"/>
+            </a:endParaRPr>
           </a:p>
         </p:txBody>
       </p:sp>
       <p:pic>
         <p:nvPicPr>
-          <p:cNvPr id="3078" name="Picture 6"/>
+          <p:cNvPr id="2054" name="Picture 6"/>
           <p:cNvPicPr>
             <a:picLocks noChangeAspect="1" noChangeArrowheads="1"/>
           </p:cNvPicPr>
@@ -8897,17 +9204,15 @@
         </p:blipFill>
         <p:spPr bwMode="auto">
           <a:xfrm>
-            <a:off x="193108" y="1822781"/>
-            <a:ext cx="5077632" cy="3076328"/>
+            <a:off x="414054" y="1871929"/>
+            <a:ext cx="4444843" cy="4373594"/>
           </a:xfrm>
           <a:prstGeom prst="rect">
             <a:avLst/>
           </a:prstGeom>
           <a:noFill/>
           <a:ln w="9525">
-            <a:solidFill>
-              <a:schemeClr val="accent1"/>
-            </a:solidFill>
+            <a:noFill/>
             <a:miter lim="800000"/>
             <a:headEnd/>
             <a:tailEnd/>
@@ -8916,7 +9221,7 @@
       </p:pic>
       <p:pic>
         <p:nvPicPr>
-          <p:cNvPr id="3080" name="Picture 8"/>
+          <p:cNvPr id="2055" name="Picture 7"/>
           <p:cNvPicPr>
             <a:picLocks noChangeAspect="1" noChangeArrowheads="1"/>
           </p:cNvPicPr>
@@ -8931,8 +9236,8 @@
         </p:blipFill>
         <p:spPr bwMode="auto">
           <a:xfrm>
-            <a:off x="4668822" y="3416060"/>
-            <a:ext cx="4346499" cy="3318385"/>
+            <a:off x="4905440" y="1889184"/>
+            <a:ext cx="4074658" cy="4519628"/>
           </a:xfrm>
           <a:prstGeom prst="rect">
             <a:avLst/>
@@ -8990,7 +9295,7 @@
           <a:p>
             <a:r>
               <a:rPr lang="en-US" dirty="0" smtClean="0"/>
-              <a:t>Themes</a:t>
+              <a:t>Transactions table generation</a:t>
             </a:r>
             <a:endParaRPr lang="en-US" dirty="0"/>
           </a:p>
@@ -8998,7 +9303,7 @@
       </p:sp>
       <p:pic>
         <p:nvPicPr>
-          <p:cNvPr id="1026" name="Picture 2"/>
+          <p:cNvPr id="3078" name="Picture 6"/>
           <p:cNvPicPr>
             <a:picLocks noChangeAspect="1" noChangeArrowheads="1"/>
           </p:cNvPicPr>
@@ -9013,8 +9318,8 @@
         </p:blipFill>
         <p:spPr bwMode="auto">
           <a:xfrm>
-            <a:off x="522257" y="1893318"/>
-            <a:ext cx="1181100" cy="3295650"/>
+            <a:off x="193108" y="1822781"/>
+            <a:ext cx="5077632" cy="3076328"/>
           </a:xfrm>
           <a:prstGeom prst="rect">
             <a:avLst/>
@@ -9032,7 +9337,7 @@
       </p:pic>
       <p:pic>
         <p:nvPicPr>
-          <p:cNvPr id="1027" name="Picture 3"/>
+          <p:cNvPr id="3080" name="Picture 8"/>
           <p:cNvPicPr>
             <a:picLocks noChangeAspect="1" noChangeArrowheads="1"/>
           </p:cNvPicPr>
@@ -9047,8 +9352,8 @@
         </p:blipFill>
         <p:spPr bwMode="auto">
           <a:xfrm>
-            <a:off x="510127" y="5306593"/>
-            <a:ext cx="2809875" cy="885825"/>
+            <a:off x="4668822" y="3416060"/>
+            <a:ext cx="4346499" cy="3318385"/>
           </a:xfrm>
           <a:prstGeom prst="rect">
             <a:avLst/>
@@ -9064,204 +9369,6 @@
           </a:ln>
         </p:spPr>
       </p:pic>
-      <p:pic>
-        <p:nvPicPr>
-          <p:cNvPr id="1028" name="Picture 4"/>
-          <p:cNvPicPr>
-            <a:picLocks noChangeAspect="1" noChangeArrowheads="1"/>
-          </p:cNvPicPr>
-          <p:nvPr/>
-        </p:nvPicPr>
-        <p:blipFill>
-          <a:blip r:embed="rId4" cstate="print"/>
-          <a:srcRect/>
-          <a:stretch>
-            <a:fillRect/>
-          </a:stretch>
-        </p:blipFill>
-        <p:spPr bwMode="auto">
-          <a:xfrm>
-            <a:off x="5083208" y="4580088"/>
-            <a:ext cx="3862388" cy="1971675"/>
-          </a:xfrm>
-          <a:prstGeom prst="rect">
-            <a:avLst/>
-          </a:prstGeom>
-          <a:noFill/>
-          <a:ln w="9525">
-            <a:solidFill>
-              <a:schemeClr val="accent1"/>
-            </a:solidFill>
-            <a:miter lim="800000"/>
-            <a:headEnd/>
-            <a:tailEnd/>
-          </a:ln>
-        </p:spPr>
-      </p:pic>
-      <p:pic>
-        <p:nvPicPr>
-          <p:cNvPr id="1029" name="Picture 5"/>
-          <p:cNvPicPr>
-            <a:picLocks noChangeAspect="1" noChangeArrowheads="1"/>
-          </p:cNvPicPr>
-          <p:nvPr/>
-        </p:nvPicPr>
-        <p:blipFill>
-          <a:blip r:embed="rId5" cstate="print"/>
-          <a:srcRect/>
-          <a:stretch>
-            <a:fillRect/>
-          </a:stretch>
-        </p:blipFill>
-        <p:spPr bwMode="auto">
-          <a:xfrm>
-            <a:off x="5091832" y="284134"/>
-            <a:ext cx="3862388" cy="1971675"/>
-          </a:xfrm>
-          <a:prstGeom prst="rect">
-            <a:avLst/>
-          </a:prstGeom>
-          <a:noFill/>
-          <a:ln w="9525">
-            <a:solidFill>
-              <a:schemeClr val="accent1"/>
-            </a:solidFill>
-            <a:miter lim="800000"/>
-            <a:headEnd/>
-            <a:tailEnd/>
-          </a:ln>
-        </p:spPr>
-      </p:pic>
-      <p:pic>
-        <p:nvPicPr>
-          <p:cNvPr id="1030" name="Picture 6"/>
-          <p:cNvPicPr>
-            <a:picLocks noChangeAspect="1" noChangeArrowheads="1"/>
-          </p:cNvPicPr>
-          <p:nvPr/>
-        </p:nvPicPr>
-        <p:blipFill>
-          <a:blip r:embed="rId6" cstate="print"/>
-          <a:srcRect/>
-          <a:stretch>
-            <a:fillRect/>
-          </a:stretch>
-        </p:blipFill>
-        <p:spPr bwMode="auto">
-          <a:xfrm>
-            <a:off x="5083206" y="2414859"/>
-            <a:ext cx="3862388" cy="1971675"/>
-          </a:xfrm>
-          <a:prstGeom prst="rect">
-            <a:avLst/>
-          </a:prstGeom>
-          <a:noFill/>
-          <a:ln w="9525">
-            <a:solidFill>
-              <a:schemeClr val="accent1"/>
-            </a:solidFill>
-            <a:miter lim="800000"/>
-            <a:headEnd/>
-            <a:tailEnd/>
-          </a:ln>
-        </p:spPr>
-      </p:pic>
-      <p:cxnSp>
-        <p:nvCxnSpPr>
-          <p:cNvPr id="11" name="Straight Connector 10"/>
-          <p:cNvCxnSpPr>
-            <a:endCxn id="1029" idx="1"/>
-          </p:cNvCxnSpPr>
-          <p:nvPr/>
-        </p:nvCxnSpPr>
-        <p:spPr>
-          <a:xfrm flipV="1">
-            <a:off x="1423358" y="1269972"/>
-            <a:ext cx="3668474" cy="1430096"/>
-          </a:xfrm>
-          <a:prstGeom prst="line">
-            <a:avLst/>
-          </a:prstGeom>
-        </p:spPr>
-        <p:style>
-          <a:lnRef idx="1">
-            <a:schemeClr val="accent1"/>
-          </a:lnRef>
-          <a:fillRef idx="0">
-            <a:schemeClr val="accent1"/>
-          </a:fillRef>
-          <a:effectRef idx="0">
-            <a:schemeClr val="accent1"/>
-          </a:effectRef>
-          <a:fontRef idx="minor">
-            <a:schemeClr val="tx1"/>
-          </a:fontRef>
-        </p:style>
-      </p:cxnSp>
-      <p:cxnSp>
-        <p:nvCxnSpPr>
-          <p:cNvPr id="13" name="Straight Connector 12"/>
-          <p:cNvCxnSpPr>
-            <a:endCxn id="1030" idx="1"/>
-          </p:cNvCxnSpPr>
-          <p:nvPr/>
-        </p:nvCxnSpPr>
-        <p:spPr>
-          <a:xfrm flipV="1">
-            <a:off x="1544128" y="3400697"/>
-            <a:ext cx="3539078" cy="489817"/>
-          </a:xfrm>
-          <a:prstGeom prst="line">
-            <a:avLst/>
-          </a:prstGeom>
-        </p:spPr>
-        <p:style>
-          <a:lnRef idx="1">
-            <a:schemeClr val="accent1"/>
-          </a:lnRef>
-          <a:fillRef idx="0">
-            <a:schemeClr val="accent1"/>
-          </a:fillRef>
-          <a:effectRef idx="0">
-            <a:schemeClr val="accent1"/>
-          </a:effectRef>
-          <a:fontRef idx="minor">
-            <a:schemeClr val="tx1"/>
-          </a:fontRef>
-        </p:style>
-      </p:cxnSp>
-      <p:cxnSp>
-        <p:nvCxnSpPr>
-          <p:cNvPr id="16" name="Straight Connector 15"/>
-          <p:cNvCxnSpPr>
-            <a:endCxn id="1028" idx="1"/>
-          </p:cNvCxnSpPr>
-          <p:nvPr/>
-        </p:nvCxnSpPr>
-        <p:spPr>
-          <a:xfrm>
-            <a:off x="1621766" y="4063042"/>
-            <a:ext cx="3461442" cy="1502884"/>
-          </a:xfrm>
-          <a:prstGeom prst="line">
-            <a:avLst/>
-          </a:prstGeom>
-        </p:spPr>
-        <p:style>
-          <a:lnRef idx="1">
-            <a:schemeClr val="accent1"/>
-          </a:lnRef>
-          <a:fillRef idx="0">
-            <a:schemeClr val="accent1"/>
-          </a:fillRef>
-          <a:effectRef idx="0">
-            <a:schemeClr val="accent1"/>
-          </a:effectRef>
-          <a:fontRef idx="minor">
-            <a:schemeClr val="tx1"/>
-          </a:fontRef>
-        </p:style>
-      </p:cxnSp>
     </p:spTree>
   </p:cSld>
   <p:clrMapOvr>
@@ -9304,169 +9411,278 @@
           <a:p>
             <a:r>
               <a:rPr lang="en-US" dirty="0" smtClean="0"/>
-              <a:t>References</a:t>
+              <a:t>Themes</a:t>
             </a:r>
             <a:endParaRPr lang="en-US" dirty="0"/>
           </a:p>
         </p:txBody>
       </p:sp>
-      <p:sp>
-        <p:nvSpPr>
-          <p:cNvPr id="3" name="Content Placeholder 2"/>
-          <p:cNvSpPr>
-            <a:spLocks noGrp="1"/>
-          </p:cNvSpPr>
-          <p:nvPr>
-            <p:ph idx="1"/>
-          </p:nvPr>
-        </p:nvSpPr>
-        <p:spPr/>
-        <p:txBody>
-          <a:bodyPr>
-            <a:normAutofit/>
-          </a:bodyPr>
-          <a:lstStyle/>
-          <a:p>
-            <a:r>
-              <a:rPr lang="en-US" dirty="0" smtClean="0"/>
-              <a:t>Wiki - </a:t>
-            </a:r>
-            <a:r>
-              <a:rPr lang="en-US" sz="1200" dirty="0" smtClean="0">
-                <a:hlinkClick r:id="rId2"/>
-              </a:rPr>
-              <a:t>https://github.com/Nasdanika/server/wiki/html</a:t>
-            </a:r>
-            <a:r>
-              <a:rPr lang="en-US" dirty="0" smtClean="0"/>
-              <a:t> </a:t>
-            </a:r>
-          </a:p>
-          <a:p>
-            <a:r>
-              <a:rPr lang="en-US" dirty="0" err="1" smtClean="0"/>
-              <a:t>WebTest</a:t>
-            </a:r>
-            <a:r>
-              <a:rPr lang="en-US" dirty="0" smtClean="0"/>
-              <a:t> report – </a:t>
-            </a:r>
-            <a:r>
-              <a:rPr lang="en-US" sz="2400" i="1" dirty="0" smtClean="0">
-                <a:latin typeface="+mj-lt"/>
-              </a:rPr>
-              <a:t>generated with </a:t>
-            </a:r>
-            <a:r>
-              <a:rPr lang="en-US" sz="2400" i="1" dirty="0" err="1" smtClean="0">
-                <a:latin typeface="+mj-lt"/>
-              </a:rPr>
-              <a:t>Nasdanika</a:t>
-            </a:r>
-            <a:r>
-              <a:rPr lang="en-US" sz="2400" i="1" dirty="0" smtClean="0">
-                <a:latin typeface="+mj-lt"/>
-              </a:rPr>
-              <a:t> HTML and shows screenshots of the application also generated with </a:t>
-            </a:r>
-            <a:r>
-              <a:rPr lang="en-US" sz="2400" i="1" dirty="0" err="1" smtClean="0">
-                <a:latin typeface="+mj-lt"/>
-              </a:rPr>
-              <a:t>Nasdanika</a:t>
-            </a:r>
-            <a:r>
-              <a:rPr lang="en-US" sz="2400" i="1" dirty="0" smtClean="0">
-                <a:latin typeface="+mj-lt"/>
-              </a:rPr>
-              <a:t> HTML </a:t>
-            </a:r>
-            <a:r>
-              <a:rPr lang="en-US" dirty="0" smtClean="0"/>
-              <a:t>– </a:t>
-            </a:r>
-            <a:r>
-              <a:rPr lang="en-US" sz="1200" dirty="0" smtClean="0">
-                <a:hlinkClick r:id="rId3"/>
-              </a:rPr>
-              <a:t>http://www.nasdanika.org/examples/test-report/</a:t>
-            </a:r>
-            <a:r>
-              <a:rPr lang="en-US" dirty="0" smtClean="0"/>
-              <a:t> </a:t>
-            </a:r>
-          </a:p>
-          <a:p>
-            <a:r>
-              <a:rPr lang="en-US" dirty="0" smtClean="0"/>
-              <a:t>Sources - </a:t>
-            </a:r>
-            <a:r>
-              <a:rPr lang="en-US" sz="1200" dirty="0" smtClean="0">
-                <a:hlinkClick r:id="rId4"/>
-              </a:rPr>
-              <a:t>https://github.com/Nasdanika/server/tree/master/org.nasdanika.html</a:t>
-            </a:r>
-            <a:r>
-              <a:rPr lang="en-US" sz="1400" dirty="0" smtClean="0"/>
-              <a:t> </a:t>
-            </a:r>
-          </a:p>
-          <a:p>
-            <a:r>
-              <a:rPr lang="en-US" dirty="0" err="1" smtClean="0"/>
-              <a:t>JavaDoc</a:t>
-            </a:r>
-            <a:r>
-              <a:rPr lang="en-US" dirty="0" smtClean="0"/>
-              <a:t> – </a:t>
-            </a:r>
-            <a:r>
-              <a:rPr lang="en-US" sz="1200" dirty="0" smtClean="0">
-                <a:hlinkClick r:id="rId5"/>
-              </a:rPr>
-              <a:t>http://www.nasdanika.org/server/apidocs/org/nasdanika/html/package-summary.html</a:t>
-            </a:r>
-            <a:r>
-              <a:rPr lang="en-US" dirty="0" smtClean="0"/>
-              <a:t>  </a:t>
-            </a:r>
-          </a:p>
-          <a:p>
-            <a:r>
-              <a:rPr lang="en-US" dirty="0" smtClean="0"/>
-              <a:t>Bootstrap themes - </a:t>
-            </a:r>
-            <a:r>
-              <a:rPr lang="en-US" sz="1200" dirty="0" smtClean="0">
-                <a:hlinkClick r:id="rId6"/>
-              </a:rPr>
-              <a:t>http://bootswatch.com/</a:t>
-            </a:r>
-            <a:endParaRPr lang="en-US" sz="1200" dirty="0" smtClean="0"/>
-          </a:p>
-          <a:p>
-            <a:r>
-              <a:rPr lang="en-US" dirty="0" err="1" smtClean="0"/>
-              <a:t>Nasdanika</a:t>
-            </a:r>
-            <a:r>
-              <a:rPr lang="en-US" dirty="0" smtClean="0"/>
-              <a:t> Foundation Server presentation - </a:t>
-            </a:r>
-            <a:r>
-              <a:rPr lang="en-US" sz="1200" dirty="0" smtClean="0">
-                <a:hlinkClick r:id="rId7"/>
-              </a:rPr>
-              <a:t>http://www.slideshare.net/PavelVlasov2/nasdanika-foundation-server</a:t>
-            </a:r>
-            <a:r>
-              <a:rPr lang="en-US" dirty="0" smtClean="0"/>
-              <a:t> </a:t>
-            </a:r>
-          </a:p>
-        </p:txBody>
-      </p:sp>
+      <p:pic>
+        <p:nvPicPr>
+          <p:cNvPr id="1026" name="Picture 2"/>
+          <p:cNvPicPr>
+            <a:picLocks noChangeAspect="1" noChangeArrowheads="1"/>
+          </p:cNvPicPr>
+          <p:nvPr/>
+        </p:nvPicPr>
+        <p:blipFill>
+          <a:blip r:embed="rId2" cstate="print"/>
+          <a:srcRect/>
+          <a:stretch>
+            <a:fillRect/>
+          </a:stretch>
+        </p:blipFill>
+        <p:spPr bwMode="auto">
+          <a:xfrm>
+            <a:off x="522257" y="1893318"/>
+            <a:ext cx="1181100" cy="3295650"/>
+          </a:xfrm>
+          <a:prstGeom prst="rect">
+            <a:avLst/>
+          </a:prstGeom>
+          <a:noFill/>
+          <a:ln w="9525">
+            <a:solidFill>
+              <a:schemeClr val="accent1"/>
+            </a:solidFill>
+            <a:miter lim="800000"/>
+            <a:headEnd/>
+            <a:tailEnd/>
+          </a:ln>
+        </p:spPr>
+      </p:pic>
+      <p:pic>
+        <p:nvPicPr>
+          <p:cNvPr id="1027" name="Picture 3"/>
+          <p:cNvPicPr>
+            <a:picLocks noChangeAspect="1" noChangeArrowheads="1"/>
+          </p:cNvPicPr>
+          <p:nvPr/>
+        </p:nvPicPr>
+        <p:blipFill>
+          <a:blip r:embed="rId3" cstate="print"/>
+          <a:srcRect/>
+          <a:stretch>
+            <a:fillRect/>
+          </a:stretch>
+        </p:blipFill>
+        <p:spPr bwMode="auto">
+          <a:xfrm>
+            <a:off x="510127" y="5306593"/>
+            <a:ext cx="2809875" cy="885825"/>
+          </a:xfrm>
+          <a:prstGeom prst="rect">
+            <a:avLst/>
+          </a:prstGeom>
+          <a:noFill/>
+          <a:ln w="9525">
+            <a:solidFill>
+              <a:schemeClr val="accent1"/>
+            </a:solidFill>
+            <a:miter lim="800000"/>
+            <a:headEnd/>
+            <a:tailEnd/>
+          </a:ln>
+        </p:spPr>
+      </p:pic>
+      <p:pic>
+        <p:nvPicPr>
+          <p:cNvPr id="1028" name="Picture 4"/>
+          <p:cNvPicPr>
+            <a:picLocks noChangeAspect="1" noChangeArrowheads="1"/>
+          </p:cNvPicPr>
+          <p:nvPr/>
+        </p:nvPicPr>
+        <p:blipFill>
+          <a:blip r:embed="rId4" cstate="print"/>
+          <a:srcRect/>
+          <a:stretch>
+            <a:fillRect/>
+          </a:stretch>
+        </p:blipFill>
+        <p:spPr bwMode="auto">
+          <a:xfrm>
+            <a:off x="5083208" y="4580088"/>
+            <a:ext cx="3862388" cy="1971675"/>
+          </a:xfrm>
+          <a:prstGeom prst="rect">
+            <a:avLst/>
+          </a:prstGeom>
+          <a:noFill/>
+          <a:ln w="9525">
+            <a:solidFill>
+              <a:schemeClr val="accent1"/>
+            </a:solidFill>
+            <a:miter lim="800000"/>
+            <a:headEnd/>
+            <a:tailEnd/>
+          </a:ln>
+        </p:spPr>
+      </p:pic>
+      <p:pic>
+        <p:nvPicPr>
+          <p:cNvPr id="1029" name="Picture 5"/>
+          <p:cNvPicPr>
+            <a:picLocks noChangeAspect="1" noChangeArrowheads="1"/>
+          </p:cNvPicPr>
+          <p:nvPr/>
+        </p:nvPicPr>
+        <p:blipFill>
+          <a:blip r:embed="rId5" cstate="print"/>
+          <a:srcRect/>
+          <a:stretch>
+            <a:fillRect/>
+          </a:stretch>
+        </p:blipFill>
+        <p:spPr bwMode="auto">
+          <a:xfrm>
+            <a:off x="5091832" y="284134"/>
+            <a:ext cx="3862388" cy="1971675"/>
+          </a:xfrm>
+          <a:prstGeom prst="rect">
+            <a:avLst/>
+          </a:prstGeom>
+          <a:noFill/>
+          <a:ln w="9525">
+            <a:solidFill>
+              <a:schemeClr val="accent1"/>
+            </a:solidFill>
+            <a:miter lim="800000"/>
+            <a:headEnd/>
+            <a:tailEnd/>
+          </a:ln>
+        </p:spPr>
+      </p:pic>
+      <p:pic>
+        <p:nvPicPr>
+          <p:cNvPr id="1030" name="Picture 6"/>
+          <p:cNvPicPr>
+            <a:picLocks noChangeAspect="1" noChangeArrowheads="1"/>
+          </p:cNvPicPr>
+          <p:nvPr/>
+        </p:nvPicPr>
+        <p:blipFill>
+          <a:blip r:embed="rId6" cstate="print"/>
+          <a:srcRect/>
+          <a:stretch>
+            <a:fillRect/>
+          </a:stretch>
+        </p:blipFill>
+        <p:spPr bwMode="auto">
+          <a:xfrm>
+            <a:off x="5083206" y="2414859"/>
+            <a:ext cx="3862388" cy="1971675"/>
+          </a:xfrm>
+          <a:prstGeom prst="rect">
+            <a:avLst/>
+          </a:prstGeom>
+          <a:noFill/>
+          <a:ln w="9525">
+            <a:solidFill>
+              <a:schemeClr val="accent1"/>
+            </a:solidFill>
+            <a:miter lim="800000"/>
+            <a:headEnd/>
+            <a:tailEnd/>
+          </a:ln>
+        </p:spPr>
+      </p:pic>
+      <p:cxnSp>
+        <p:nvCxnSpPr>
+          <p:cNvPr id="11" name="Straight Connector 10"/>
+          <p:cNvCxnSpPr>
+            <a:endCxn id="1029" idx="1"/>
+          </p:cNvCxnSpPr>
+          <p:nvPr/>
+        </p:nvCxnSpPr>
+        <p:spPr>
+          <a:xfrm flipV="1">
+            <a:off x="1423358" y="1269972"/>
+            <a:ext cx="3668474" cy="1430096"/>
+          </a:xfrm>
+          <a:prstGeom prst="line">
+            <a:avLst/>
+          </a:prstGeom>
+        </p:spPr>
+        <p:style>
+          <a:lnRef idx="1">
+            <a:schemeClr val="accent1"/>
+          </a:lnRef>
+          <a:fillRef idx="0">
+            <a:schemeClr val="accent1"/>
+          </a:fillRef>
+          <a:effectRef idx="0">
+            <a:schemeClr val="accent1"/>
+          </a:effectRef>
+          <a:fontRef idx="minor">
+            <a:schemeClr val="tx1"/>
+          </a:fontRef>
+        </p:style>
+      </p:cxnSp>
+      <p:cxnSp>
+        <p:nvCxnSpPr>
+          <p:cNvPr id="13" name="Straight Connector 12"/>
+          <p:cNvCxnSpPr>
+            <a:endCxn id="1030" idx="1"/>
+          </p:cNvCxnSpPr>
+          <p:nvPr/>
+        </p:nvCxnSpPr>
+        <p:spPr>
+          <a:xfrm flipV="1">
+            <a:off x="1544128" y="3400697"/>
+            <a:ext cx="3539078" cy="489817"/>
+          </a:xfrm>
+          <a:prstGeom prst="line">
+            <a:avLst/>
+          </a:prstGeom>
+        </p:spPr>
+        <p:style>
+          <a:lnRef idx="1">
+            <a:schemeClr val="accent1"/>
+          </a:lnRef>
+          <a:fillRef idx="0">
+            <a:schemeClr val="accent1"/>
+          </a:fillRef>
+          <a:effectRef idx="0">
+            <a:schemeClr val="accent1"/>
+          </a:effectRef>
+          <a:fontRef idx="minor">
+            <a:schemeClr val="tx1"/>
+          </a:fontRef>
+        </p:style>
+      </p:cxnSp>
+      <p:cxnSp>
+        <p:nvCxnSpPr>
+          <p:cNvPr id="16" name="Straight Connector 15"/>
+          <p:cNvCxnSpPr>
+            <a:endCxn id="1028" idx="1"/>
+          </p:cNvCxnSpPr>
+          <p:nvPr/>
+        </p:nvCxnSpPr>
+        <p:spPr>
+          <a:xfrm>
+            <a:off x="1621766" y="4063042"/>
+            <a:ext cx="3461442" cy="1502884"/>
+          </a:xfrm>
+          <a:prstGeom prst="line">
+            <a:avLst/>
+          </a:prstGeom>
+        </p:spPr>
+        <p:style>
+          <a:lnRef idx="1">
+            <a:schemeClr val="accent1"/>
+          </a:lnRef>
+          <a:fillRef idx="0">
+            <a:schemeClr val="accent1"/>
+          </a:fillRef>
+          <a:effectRef idx="0">
+            <a:schemeClr val="accent1"/>
+          </a:effectRef>
+          <a:fontRef idx="minor">
+            <a:schemeClr val="tx1"/>
+          </a:fontRef>
+        </p:style>
+      </p:cxnSp>
     </p:spTree>
   </p:cSld>
   <p:clrMapOvr>
@@ -9730,6 +9946,211 @@
       </p:par>
     </p:tnLst>
   </p:timing>
+</p:sld>
+</file>
+
+<file path=ppt/slides/slide30.xml><?xml version="1.0" encoding="utf-8"?>
+<p:sld xmlns:a="http://schemas.openxmlformats.org/drawingml/2006/main" xmlns:r="http://schemas.openxmlformats.org/officeDocument/2006/relationships" xmlns:p="http://schemas.openxmlformats.org/presentationml/2006/main">
+  <p:cSld>
+    <p:spTree>
+      <p:nvGrpSpPr>
+        <p:cNvPr id="1" name=""/>
+        <p:cNvGrpSpPr/>
+        <p:nvPr/>
+      </p:nvGrpSpPr>
+      <p:grpSpPr>
+        <a:xfrm>
+          <a:off x="0" y="0"/>
+          <a:ext cx="0" cy="0"/>
+          <a:chOff x="0" y="0"/>
+          <a:chExt cx="0" cy="0"/>
+        </a:xfrm>
+      </p:grpSpPr>
+      <p:sp>
+        <p:nvSpPr>
+          <p:cNvPr id="2" name="Title 1"/>
+          <p:cNvSpPr>
+            <a:spLocks noGrp="1"/>
+          </p:cNvSpPr>
+          <p:nvPr>
+            <p:ph type="title"/>
+          </p:nvPr>
+        </p:nvSpPr>
+        <p:spPr/>
+        <p:txBody>
+          <a:bodyPr/>
+          <a:lstStyle/>
+          <a:p>
+            <a:r>
+              <a:rPr lang="en-US" dirty="0" smtClean="0"/>
+              <a:t>References</a:t>
+            </a:r>
+            <a:endParaRPr lang="en-US" dirty="0"/>
+          </a:p>
+        </p:txBody>
+      </p:sp>
+      <p:sp>
+        <p:nvSpPr>
+          <p:cNvPr id="3" name="Content Placeholder 2"/>
+          <p:cNvSpPr>
+            <a:spLocks noGrp="1"/>
+          </p:cNvSpPr>
+          <p:nvPr>
+            <p:ph idx="1"/>
+          </p:nvPr>
+        </p:nvSpPr>
+        <p:spPr/>
+        <p:txBody>
+          <a:bodyPr>
+            <a:normAutofit/>
+          </a:bodyPr>
+          <a:lstStyle/>
+          <a:p>
+            <a:r>
+              <a:rPr lang="en-US" dirty="0" smtClean="0"/>
+              <a:t>Wiki - </a:t>
+            </a:r>
+            <a:r>
+              <a:rPr lang="en-US" sz="1200" dirty="0" smtClean="0">
+                <a:hlinkClick r:id="rId2"/>
+              </a:rPr>
+              <a:t>https://github.com/Nasdanika/server/wiki/html</a:t>
+            </a:r>
+            <a:r>
+              <a:rPr lang="en-US" dirty="0" smtClean="0"/>
+              <a:t> </a:t>
+            </a:r>
+          </a:p>
+          <a:p>
+            <a:r>
+              <a:rPr lang="en-US" dirty="0" err="1" smtClean="0"/>
+              <a:t>WebTest</a:t>
+            </a:r>
+            <a:r>
+              <a:rPr lang="en-US" dirty="0" smtClean="0"/>
+              <a:t> report – </a:t>
+            </a:r>
+            <a:r>
+              <a:rPr lang="en-US" sz="2400" i="1" dirty="0" smtClean="0">
+                <a:latin typeface="+mj-lt"/>
+              </a:rPr>
+              <a:t>generated with </a:t>
+            </a:r>
+            <a:r>
+              <a:rPr lang="en-US" sz="2400" i="1" dirty="0" err="1" smtClean="0">
+                <a:latin typeface="+mj-lt"/>
+              </a:rPr>
+              <a:t>Nasdanika</a:t>
+            </a:r>
+            <a:r>
+              <a:rPr lang="en-US" sz="2400" i="1" dirty="0" smtClean="0">
+                <a:latin typeface="+mj-lt"/>
+              </a:rPr>
+              <a:t> HTML and shows screenshots of the application also generated with </a:t>
+            </a:r>
+            <a:r>
+              <a:rPr lang="en-US" sz="2400" i="1" dirty="0" err="1" smtClean="0">
+                <a:latin typeface="+mj-lt"/>
+              </a:rPr>
+              <a:t>Nasdanika</a:t>
+            </a:r>
+            <a:r>
+              <a:rPr lang="en-US" sz="2400" i="1" dirty="0" smtClean="0">
+                <a:latin typeface="+mj-lt"/>
+              </a:rPr>
+              <a:t> HTML </a:t>
+            </a:r>
+            <a:r>
+              <a:rPr lang="en-US" dirty="0" smtClean="0"/>
+              <a:t>– </a:t>
+            </a:r>
+            <a:r>
+              <a:rPr lang="en-US" sz="1200" dirty="0" smtClean="0">
+                <a:hlinkClick r:id="rId3"/>
+              </a:rPr>
+              <a:t>http://www.nasdanika.org/examples/test-report/</a:t>
+            </a:r>
+            <a:r>
+              <a:rPr lang="en-US" dirty="0" smtClean="0"/>
+              <a:t> </a:t>
+            </a:r>
+          </a:p>
+          <a:p>
+            <a:r>
+              <a:rPr lang="en-US" dirty="0" smtClean="0"/>
+              <a:t>Sources - </a:t>
+            </a:r>
+            <a:r>
+              <a:rPr lang="en-US" sz="1200" dirty="0" smtClean="0">
+                <a:hlinkClick r:id="rId4"/>
+              </a:rPr>
+              <a:t>https://github.com/Nasdanika/server/tree/master/org.nasdanika.html</a:t>
+            </a:r>
+            <a:r>
+              <a:rPr lang="en-US" sz="1400" dirty="0" smtClean="0"/>
+              <a:t> </a:t>
+            </a:r>
+          </a:p>
+          <a:p>
+            <a:r>
+              <a:rPr lang="en-US" dirty="0" err="1" smtClean="0"/>
+              <a:t>JavaDoc</a:t>
+            </a:r>
+            <a:r>
+              <a:rPr lang="en-US" dirty="0" smtClean="0"/>
+              <a:t> – </a:t>
+            </a:r>
+            <a:r>
+              <a:rPr lang="en-US" sz="1200" dirty="0" smtClean="0">
+                <a:hlinkClick r:id="rId5"/>
+              </a:rPr>
+              <a:t>http://www.nasdanika.org/server/apidocs/org/nasdanika/html/package-summary.html</a:t>
+            </a:r>
+            <a:r>
+              <a:rPr lang="en-US" dirty="0" smtClean="0"/>
+              <a:t>  </a:t>
+            </a:r>
+          </a:p>
+          <a:p>
+            <a:r>
+              <a:rPr lang="en-US" dirty="0" smtClean="0"/>
+              <a:t>Bootstrap themes - </a:t>
+            </a:r>
+            <a:r>
+              <a:rPr lang="en-US" sz="1200" dirty="0" smtClean="0">
+                <a:hlinkClick r:id="rId6"/>
+              </a:rPr>
+              <a:t>http://bootswatch.com/</a:t>
+            </a:r>
+            <a:endParaRPr lang="en-US" sz="1200" dirty="0" smtClean="0"/>
+          </a:p>
+          <a:p>
+            <a:r>
+              <a:rPr lang="en-US" dirty="0" err="1" smtClean="0"/>
+              <a:t>Nasdanika</a:t>
+            </a:r>
+            <a:r>
+              <a:rPr lang="en-US" dirty="0" smtClean="0"/>
+              <a:t> Foundation Server presentation - </a:t>
+            </a:r>
+            <a:r>
+              <a:rPr lang="en-US" sz="1200" dirty="0" smtClean="0">
+                <a:hlinkClick r:id="rId7"/>
+              </a:rPr>
+              <a:t>http://www.slideshare.net/PavelVlasov2/nasdanika-foundation-server</a:t>
+            </a:r>
+            <a:r>
+              <a:rPr lang="en-US" dirty="0" smtClean="0"/>
+              <a:t> </a:t>
+            </a:r>
+          </a:p>
+        </p:txBody>
+      </p:sp>
+    </p:spTree>
+  </p:cSld>
+  <p:clrMapOvr>
+    <a:masterClrMapping/>
+  </p:clrMapOvr>
 </p:sld>
 </file>
 

</xml_diff>